<commit_message>
query processor for timestamp
</commit_message>
<xml_diff>
--- a/docs/tiny-snb-for-tests.pptx
+++ b/docs/tiny-snb-for-tests.pptx
@@ -2096,7 +2096,7 @@
           </a:ln>
           <a:extLst>
             <a:ext uri="{C572A759-6A51-4108-AA02-DFA0A04FC94B}">
-              <ma14:wrappingTextBoxFlag xmlns="" xmlns:m="http://schemas.openxmlformats.org/officeDocument/2006/math" xmlns:a14="http://schemas.microsoft.com/office/drawing/2010/main" xmlns:ma14="http://schemas.microsoft.com/office/mac/drawingml/2011/main" val="1"/>
+              <ma14:wrappingTextBoxFlag xmlns:ma14="http://schemas.microsoft.com/office/mac/drawingml/2011/main" xmlns:a14="http://schemas.microsoft.com/office/drawing/2010/main" xmlns:m="http://schemas.openxmlformats.org/officeDocument/2006/math" xmlns="" val="1"/>
             </a:ext>
           </a:extLst>
         </p:spPr>
@@ -2135,7 +2135,7 @@
           </a:ln>
           <a:extLst>
             <a:ext uri="{C572A759-6A51-4108-AA02-DFA0A04FC94B}">
-              <ma14:wrappingTextBoxFlag xmlns="" xmlns:m="http://schemas.openxmlformats.org/officeDocument/2006/math" xmlns:a14="http://schemas.microsoft.com/office/drawing/2010/main" xmlns:ma14="http://schemas.microsoft.com/office/mac/drawingml/2011/main" val="1"/>
+              <ma14:wrappingTextBoxFlag xmlns:ma14="http://schemas.microsoft.com/office/mac/drawingml/2011/main" xmlns:a14="http://schemas.microsoft.com/office/drawing/2010/main" xmlns:m="http://schemas.openxmlformats.org/officeDocument/2006/math" xmlns="" val="1"/>
             </a:ext>
           </a:extLst>
         </p:spPr>
@@ -3125,7 +3125,7 @@
             <a:effectLst/>
             <a:extLst>
               <a:ext uri="{C572A759-6A51-4108-AA02-DFA0A04FC94B}">
-                <ma14:wrappingTextBoxFlag xmlns="" xmlns:m="http://schemas.openxmlformats.org/officeDocument/2006/math" xmlns:a14="http://schemas.microsoft.com/office/drawing/2010/main" xmlns:ma14="http://schemas.microsoft.com/office/mac/drawingml/2011/main" val="1"/>
+                <ma14:wrappingTextBoxFlag xmlns:ma14="http://schemas.microsoft.com/office/mac/drawingml/2011/main" xmlns:a14="http://schemas.microsoft.com/office/drawing/2010/main" xmlns:m="http://schemas.openxmlformats.org/officeDocument/2006/math" xmlns="" val="1"/>
               </a:ext>
             </a:extLst>
           </p:spPr>
@@ -3229,7 +3229,7 @@
             <a:effectLst/>
             <a:extLst>
               <a:ext uri="{C572A759-6A51-4108-AA02-DFA0A04FC94B}">
-                <ma14:wrappingTextBoxFlag xmlns="" xmlns:m="http://schemas.openxmlformats.org/officeDocument/2006/math" xmlns:a14="http://schemas.microsoft.com/office/drawing/2010/main" xmlns:ma14="http://schemas.microsoft.com/office/mac/drawingml/2011/main" val="1"/>
+                <ma14:wrappingTextBoxFlag xmlns:ma14="http://schemas.microsoft.com/office/mac/drawingml/2011/main" xmlns:a14="http://schemas.microsoft.com/office/drawing/2010/main" xmlns:m="http://schemas.openxmlformats.org/officeDocument/2006/math" xmlns="" val="1"/>
               </a:ext>
             </a:extLst>
           </p:spPr>
@@ -3333,7 +3333,7 @@
             <a:effectLst/>
             <a:extLst>
               <a:ext uri="{C572A759-6A51-4108-AA02-DFA0A04FC94B}">
-                <ma14:wrappingTextBoxFlag xmlns="" xmlns:m="http://schemas.openxmlformats.org/officeDocument/2006/math" xmlns:a14="http://schemas.microsoft.com/office/drawing/2010/main" xmlns:ma14="http://schemas.microsoft.com/office/mac/drawingml/2011/main" val="1"/>
+                <ma14:wrappingTextBoxFlag xmlns:ma14="http://schemas.microsoft.com/office/mac/drawingml/2011/main" xmlns:a14="http://schemas.microsoft.com/office/drawing/2010/main" xmlns:m="http://schemas.openxmlformats.org/officeDocument/2006/math" xmlns="" val="1"/>
               </a:ext>
             </a:extLst>
           </p:spPr>
@@ -3437,7 +3437,7 @@
             <a:effectLst/>
             <a:extLst>
               <a:ext uri="{C572A759-6A51-4108-AA02-DFA0A04FC94B}">
-                <ma14:wrappingTextBoxFlag xmlns="" xmlns:m="http://schemas.openxmlformats.org/officeDocument/2006/math" xmlns:a14="http://schemas.microsoft.com/office/drawing/2010/main" xmlns:ma14="http://schemas.microsoft.com/office/mac/drawingml/2011/main" val="1"/>
+                <ma14:wrappingTextBoxFlag xmlns:ma14="http://schemas.microsoft.com/office/mac/drawingml/2011/main" xmlns:a14="http://schemas.microsoft.com/office/drawing/2010/main" xmlns:m="http://schemas.openxmlformats.org/officeDocument/2006/math" xmlns="" val="1"/>
               </a:ext>
             </a:extLst>
           </p:spPr>
@@ -3541,7 +3541,7 @@
             <a:effectLst/>
             <a:extLst>
               <a:ext uri="{C572A759-6A51-4108-AA02-DFA0A04FC94B}">
-                <ma14:wrappingTextBoxFlag xmlns="" xmlns:m="http://schemas.openxmlformats.org/officeDocument/2006/math" xmlns:a14="http://schemas.microsoft.com/office/drawing/2010/main" xmlns:ma14="http://schemas.microsoft.com/office/mac/drawingml/2011/main" val="1"/>
+                <ma14:wrappingTextBoxFlag xmlns:ma14="http://schemas.microsoft.com/office/mac/drawingml/2011/main" xmlns:a14="http://schemas.microsoft.com/office/drawing/2010/main" xmlns:m="http://schemas.openxmlformats.org/officeDocument/2006/math" xmlns="" val="1"/>
               </a:ext>
             </a:extLst>
           </p:spPr>
@@ -3645,7 +3645,7 @@
             <a:effectLst/>
             <a:extLst>
               <a:ext uri="{C572A759-6A51-4108-AA02-DFA0A04FC94B}">
-                <ma14:wrappingTextBoxFlag xmlns="" xmlns:m="http://schemas.openxmlformats.org/officeDocument/2006/math" xmlns:a14="http://schemas.microsoft.com/office/drawing/2010/main" xmlns:ma14="http://schemas.microsoft.com/office/mac/drawingml/2011/main" val="1"/>
+                <ma14:wrappingTextBoxFlag xmlns:ma14="http://schemas.microsoft.com/office/mac/drawingml/2011/main" xmlns:a14="http://schemas.microsoft.com/office/drawing/2010/main" xmlns:m="http://schemas.openxmlformats.org/officeDocument/2006/math" xmlns="" val="1"/>
               </a:ext>
             </a:extLst>
           </p:spPr>
@@ -3772,7 +3772,7 @@
         </p:nvSpPr>
         <p:spPr>
           <a:xfrm>
-            <a:off x="8505856" y="2884296"/>
+            <a:off x="8469722" y="2961775"/>
             <a:ext cx="1290639" cy="2"/>
           </a:xfrm>
           <a:prstGeom prst="line">
@@ -3801,7 +3801,7 @@
         </p:nvSpPr>
         <p:spPr>
           <a:xfrm>
-            <a:off x="8361394" y="1175414"/>
+            <a:off x="8395597" y="817275"/>
             <a:ext cx="1153817" cy="358139"/>
           </a:xfrm>
           <a:prstGeom prst="rect">
@@ -3812,7 +3812,7 @@
           </a:ln>
           <a:extLst>
             <a:ext uri="{C572A759-6A51-4108-AA02-DFA0A04FC94B}">
-              <ma14:wrappingTextBoxFlag xmlns="" xmlns:m="http://schemas.openxmlformats.org/officeDocument/2006/math" xmlns:a14="http://schemas.microsoft.com/office/drawing/2010/main" xmlns:ma14="http://schemas.microsoft.com/office/mac/drawingml/2011/main" val="1"/>
+              <ma14:wrappingTextBoxFlag xmlns:ma14="http://schemas.microsoft.com/office/mac/drawingml/2011/main" xmlns:a14="http://schemas.microsoft.com/office/drawing/2010/main" xmlns:m="http://schemas.openxmlformats.org/officeDocument/2006/math" xmlns="" val="1"/>
             </a:ext>
           </a:extLst>
         </p:spPr>
@@ -3823,6 +3823,7 @@
           <a:lstStyle/>
           <a:p>
             <a:r>
+              <a:rPr dirty="0"/>
               <a:t>PERSON</a:t>
             </a:r>
           </a:p>
@@ -3836,8 +3837,8 @@
         </p:nvSpPr>
         <p:spPr>
           <a:xfrm>
-            <a:off x="3376648" y="728882"/>
-            <a:ext cx="1304926" cy="353939"/>
+            <a:off x="3303185" y="652186"/>
+            <a:ext cx="2343783" cy="830993"/>
           </a:xfrm>
           <a:prstGeom prst="rect">
             <a:avLst/>
@@ -3847,7 +3848,131 @@
           </a:ln>
           <a:extLst>
             <a:ext uri="{C572A759-6A51-4108-AA02-DFA0A04FC94B}">
-              <ma14:wrappingTextBoxFlag xmlns="" xmlns:m="http://schemas.openxmlformats.org/officeDocument/2006/math" xmlns:a14="http://schemas.microsoft.com/office/drawing/2010/main" xmlns:ma14="http://schemas.microsoft.com/office/mac/drawingml/2011/main" val="1"/>
+              <ma14:wrappingTextBoxFlag xmlns:ma14="http://schemas.microsoft.com/office/mac/drawingml/2011/main" xmlns:a14="http://schemas.microsoft.com/office/drawing/2010/main" xmlns:m="http://schemas.openxmlformats.org/officeDocument/2006/math" xmlns="" val="1"/>
+            </a:ext>
+          </a:extLst>
+        </p:spPr>
+        <p:txBody>
+          <a:bodyPr wrap="square" lIns="45718" tIns="45718" rIns="45718" bIns="45718">
+            <a:spAutoFit/>
+          </a:bodyPr>
+          <a:lstStyle>
+            <a:lvl1pPr algn="ctr">
+              <a:defRPr sz="1700"/>
+            </a:lvl1pPr>
+          </a:lstStyle>
+          <a:p>
+            <a:pPr algn="l"/>
+            <a:r>
+              <a:rPr lang="en-US" sz="1200" dirty="0">
+                <a:latin typeface="Arial" panose="020B0604020202020204" pitchFamily="34" charset="0"/>
+                <a:cs typeface="Arial" panose="020B0604020202020204" pitchFamily="34" charset="0"/>
+              </a:rPr>
+              <a:t>da</a:t>
+            </a:r>
+            <a:r>
+              <a:rPr lang="en-US" altLang="zh-CN" sz="1200" dirty="0">
+                <a:latin typeface="Arial" panose="020B0604020202020204" pitchFamily="34" charset="0"/>
+                <a:cs typeface="Arial" panose="020B0604020202020204" pitchFamily="34" charset="0"/>
+              </a:rPr>
+              <a:t>te:</a:t>
+            </a:r>
+            <a:r>
+              <a:rPr lang="en-US" sz="1200" dirty="0">
+                <a:latin typeface="Arial" panose="020B0604020202020204" pitchFamily="34" charset="0"/>
+                <a:cs typeface="Arial" panose="020B0604020202020204" pitchFamily="34" charset="0"/>
+              </a:rPr>
+              <a:t>2021-06-30</a:t>
+            </a:r>
+          </a:p>
+          <a:p>
+            <a:pPr algn="l"/>
+            <a:r>
+              <a:rPr lang="en-US" sz="1200" dirty="0" err="1">
+                <a:latin typeface="Arial" panose="020B0604020202020204" pitchFamily="34" charset="0"/>
+                <a:cs typeface="Arial" panose="020B0604020202020204" pitchFamily="34" charset="0"/>
+              </a:rPr>
+              <a:t>meetTime</a:t>
+            </a:r>
+            <a:r>
+              <a:rPr lang="en-US" sz="1200" dirty="0">
+                <a:latin typeface="Arial" panose="020B0604020202020204" pitchFamily="34" charset="0"/>
+                <a:cs typeface="Arial" panose="020B0604020202020204" pitchFamily="34" charset="0"/>
+              </a:rPr>
+              <a:t>: </a:t>
+            </a:r>
+            <a:r>
+              <a:rPr lang="en-US" altLang="zh-CN" sz="1200" b="0" i="0" dirty="0">
+                <a:solidFill>
+                  <a:srgbClr val="24292F"/>
+                </a:solidFill>
+                <a:effectLst/>
+                <a:latin typeface="Arial" panose="020B0604020202020204" pitchFamily="34" charset="0"/>
+                <a:cs typeface="Arial" panose="020B0604020202020204" pitchFamily="34" charset="0"/>
+              </a:rPr>
+              <a:t>1946-08-25 19:07:22</a:t>
+            </a:r>
+          </a:p>
+          <a:p>
+            <a:pPr algn="l"/>
+            <a:r>
+              <a:rPr lang="en-US" sz="1200" dirty="0" err="1">
+                <a:solidFill>
+                  <a:srgbClr val="24292F"/>
+                </a:solidFill>
+                <a:latin typeface="Arial" panose="020B0604020202020204" pitchFamily="34" charset="0"/>
+                <a:cs typeface="Arial" panose="020B0604020202020204" pitchFamily="34" charset="0"/>
+              </a:rPr>
+              <a:t>meetTime</a:t>
+            </a:r>
+            <a:r>
+              <a:rPr lang="en-US" sz="1200" dirty="0">
+                <a:solidFill>
+                  <a:srgbClr val="24292F"/>
+                </a:solidFill>
+                <a:latin typeface="Arial" panose="020B0604020202020204" pitchFamily="34" charset="0"/>
+                <a:cs typeface="Arial" panose="020B0604020202020204" pitchFamily="34" charset="0"/>
+              </a:rPr>
+              <a:t>: </a:t>
+            </a:r>
+            <a:r>
+              <a:rPr lang="en-US" altLang="zh-CN" sz="1200" b="0" i="0" dirty="0">
+                <a:solidFill>
+                  <a:srgbClr val="24292F"/>
+                </a:solidFill>
+                <a:effectLst/>
+                <a:latin typeface="Arial" panose="020B0604020202020204" pitchFamily="34" charset="0"/>
+                <a:cs typeface="Arial" panose="020B0604020202020204" pitchFamily="34" charset="0"/>
+              </a:rPr>
+              <a:t>2002-07-31 11:42:53.12342</a:t>
+            </a:r>
+            <a:endParaRPr sz="1200" dirty="0">
+              <a:latin typeface="Arial" panose="020B0604020202020204" pitchFamily="34" charset="0"/>
+              <a:cs typeface="Arial" panose="020B0604020202020204" pitchFamily="34" charset="0"/>
+            </a:endParaRPr>
+          </a:p>
+        </p:txBody>
+      </p:sp>
+      <p:sp>
+        <p:nvSpPr>
+          <p:cNvPr id="136" name="TextBox 22"/>
+          <p:cNvSpPr txBox="1"/>
+          <p:nvPr/>
+        </p:nvSpPr>
+        <p:spPr>
+          <a:xfrm rot="2388290">
+            <a:off x="4341566" y="2228908"/>
+            <a:ext cx="1304926" cy="1015659"/>
+          </a:xfrm>
+          <a:prstGeom prst="rect">
+            <a:avLst/>
+          </a:prstGeom>
+          <a:ln w="12700">
+            <a:miter lim="400000"/>
+          </a:ln>
+          <a:extLst>
+            <a:ext uri="{C572A759-6A51-4108-AA02-DFA0A04FC94B}">
+              <ma14:wrappingTextBoxFlag xmlns:ma14="http://schemas.microsoft.com/office/mac/drawingml/2011/main" xmlns:a14="http://schemas.microsoft.com/office/drawing/2010/main" xmlns:m="http://schemas.openxmlformats.org/officeDocument/2006/math" xmlns="" val="1"/>
             </a:ext>
           </a:extLst>
         </p:spPr>
@@ -3861,53 +3986,87 @@
             </a:lvl1pPr>
           </a:lstStyle>
           <a:p>
-            <a:pPr algn="r"/>
-            <a:r>
-              <a:rPr lang="en-US" dirty="0"/>
+            <a:pPr algn="l"/>
+            <a:r>
+              <a:rPr lang="en-US" altLang="zh-CN" sz="1200" dirty="0">
+                <a:latin typeface="Arial" panose="020B0604020202020204" pitchFamily="34" charset="0"/>
+                <a:cs typeface="Arial" panose="020B0604020202020204" pitchFamily="34" charset="0"/>
+              </a:rPr>
+              <a:t>date: </a:t>
+            </a:r>
+            <a:r>
+              <a:rPr lang="en-US" sz="1200" dirty="0">
+                <a:latin typeface="Arial" panose="020B0604020202020204" pitchFamily="34" charset="0"/>
+                <a:cs typeface="Arial" panose="020B0604020202020204" pitchFamily="34" charset="0"/>
+              </a:rPr>
               <a:t>2021-06-30</a:t>
             </a:r>
-            <a:endParaRPr dirty="0"/>
-          </a:p>
-        </p:txBody>
-      </p:sp>
-      <p:sp>
-        <p:nvSpPr>
-          <p:cNvPr id="136" name="TextBox 22"/>
-          <p:cNvSpPr txBox="1"/>
-          <p:nvPr/>
-        </p:nvSpPr>
-        <p:spPr>
-          <a:xfrm rot="2388290">
-            <a:off x="2909421" y="1673805"/>
-            <a:ext cx="1304926" cy="353939"/>
-          </a:xfrm>
-          <a:prstGeom prst="rect">
-            <a:avLst/>
-          </a:prstGeom>
-          <a:ln w="12700">
-            <a:miter lim="400000"/>
-          </a:ln>
-          <a:extLst>
-            <a:ext uri="{C572A759-6A51-4108-AA02-DFA0A04FC94B}">
-              <ma14:wrappingTextBoxFlag xmlns="" xmlns:m="http://schemas.openxmlformats.org/officeDocument/2006/math" xmlns:a14="http://schemas.microsoft.com/office/drawing/2010/main" xmlns:ma14="http://schemas.microsoft.com/office/mac/drawingml/2011/main" val="1"/>
-            </a:ext>
-          </a:extLst>
-        </p:spPr>
-        <p:txBody>
-          <a:bodyPr lIns="45718" tIns="45718" rIns="45718" bIns="45718">
-            <a:spAutoFit/>
-          </a:bodyPr>
-          <a:lstStyle>
-            <a:lvl1pPr algn="ctr">
-              <a:defRPr sz="1700"/>
-            </a:lvl1pPr>
-          </a:lstStyle>
-          <a:p>
-            <a:r>
-              <a:rPr lang="en-US" dirty="0"/>
-              <a:t>2021-06-30</a:t>
-            </a:r>
-            <a:endParaRPr dirty="0"/>
+          </a:p>
+          <a:p>
+            <a:pPr algn="l"/>
+            <a:r>
+              <a:rPr lang="en-US" sz="1200" dirty="0" err="1">
+                <a:latin typeface="Arial" panose="020B0604020202020204" pitchFamily="34" charset="0"/>
+                <a:cs typeface="Arial" panose="020B0604020202020204" pitchFamily="34" charset="0"/>
+              </a:rPr>
+              <a:t>meeTime</a:t>
+            </a:r>
+            <a:r>
+              <a:rPr lang="en-US" sz="1200" dirty="0">
+                <a:latin typeface="Arial" panose="020B0604020202020204" pitchFamily="34" charset="0"/>
+                <a:cs typeface="Arial" panose="020B0604020202020204" pitchFamily="34" charset="0"/>
+              </a:rPr>
+              <a:t>: </a:t>
+            </a:r>
+            <a:r>
+              <a:rPr lang="en-US" altLang="zh-CN" sz="1200" b="0" i="0" dirty="0">
+                <a:solidFill>
+                  <a:srgbClr val="24292F"/>
+                </a:solidFill>
+                <a:effectLst/>
+                <a:latin typeface="Arial" panose="020B0604020202020204" pitchFamily="34" charset="0"/>
+                <a:cs typeface="Arial" panose="020B0604020202020204" pitchFamily="34" charset="0"/>
+              </a:rPr>
+              <a:t>2012-12-11 20:07:22</a:t>
+            </a:r>
+          </a:p>
+          <a:p>
+            <a:pPr algn="l"/>
+            <a:r>
+              <a:rPr lang="en-US" sz="1200" dirty="0" err="1">
+                <a:solidFill>
+                  <a:srgbClr val="24292F"/>
+                </a:solidFill>
+                <a:latin typeface="Arial" panose="020B0604020202020204" pitchFamily="34" charset="0"/>
+                <a:cs typeface="Arial" panose="020B0604020202020204" pitchFamily="34" charset="0"/>
+              </a:rPr>
+              <a:t>meetTime</a:t>
+            </a:r>
+            <a:r>
+              <a:rPr lang="en-US" sz="1200" dirty="0">
+                <a:solidFill>
+                  <a:srgbClr val="24292F"/>
+                </a:solidFill>
+                <a:latin typeface="Arial" panose="020B0604020202020204" pitchFamily="34" charset="0"/>
+                <a:cs typeface="Arial" panose="020B0604020202020204" pitchFamily="34" charset="0"/>
+              </a:rPr>
+              <a:t>: </a:t>
+            </a:r>
+            <a:r>
+              <a:rPr lang="en-US" altLang="zh-CN" sz="1200" b="0" i="0" dirty="0">
+                <a:solidFill>
+                  <a:srgbClr val="24292F"/>
+                </a:solidFill>
+                <a:effectLst/>
+                <a:latin typeface="Arial" panose="020B0604020202020204" pitchFamily="34" charset="0"/>
+                <a:cs typeface="Arial" panose="020B0604020202020204" pitchFamily="34" charset="0"/>
+              </a:rPr>
+              <a:t>1936-11-02 11:02:01</a:t>
+            </a:r>
+            <a:endParaRPr sz="1200" dirty="0">
+              <a:latin typeface="Arial" panose="020B0604020202020204" pitchFamily="34" charset="0"/>
+              <a:cs typeface="Arial" panose="020B0604020202020204" pitchFamily="34" charset="0"/>
+            </a:endParaRPr>
           </a:p>
         </p:txBody>
       </p:sp>
@@ -3919,8 +4078,8 @@
         </p:nvSpPr>
         <p:spPr>
           <a:xfrm rot="16200000">
-            <a:off x="2096737" y="1941311"/>
-            <a:ext cx="1304926" cy="353939"/>
+            <a:off x="2048814" y="1601359"/>
+            <a:ext cx="1532677" cy="1015659"/>
           </a:xfrm>
           <a:prstGeom prst="rect">
             <a:avLst/>
@@ -3930,12 +4089,12 @@
           </a:ln>
           <a:extLst>
             <a:ext uri="{C572A759-6A51-4108-AA02-DFA0A04FC94B}">
-              <ma14:wrappingTextBoxFlag xmlns="" xmlns:m="http://schemas.openxmlformats.org/officeDocument/2006/math" xmlns:a14="http://schemas.microsoft.com/office/drawing/2010/main" xmlns:ma14="http://schemas.microsoft.com/office/mac/drawingml/2011/main" val="1"/>
+              <ma14:wrappingTextBoxFlag xmlns:ma14="http://schemas.microsoft.com/office/mac/drawingml/2011/main" xmlns:a14="http://schemas.microsoft.com/office/drawing/2010/main" xmlns:m="http://schemas.openxmlformats.org/officeDocument/2006/math" xmlns="" val="1"/>
             </a:ext>
           </a:extLst>
         </p:spPr>
         <p:txBody>
-          <a:bodyPr lIns="45718" tIns="45718" rIns="45718" bIns="45718">
+          <a:bodyPr wrap="square" lIns="45718" tIns="45718" rIns="45718" bIns="45718">
             <a:spAutoFit/>
           </a:bodyPr>
           <a:lstStyle>
@@ -3945,10 +4104,77 @@
           </a:lstStyle>
           <a:p>
             <a:r>
-              <a:rPr lang="en-US" dirty="0"/>
+              <a:rPr lang="en-US" altLang="zh-CN" sz="1200" dirty="0">
+                <a:latin typeface="Arial" panose="020B0604020202020204" pitchFamily="34" charset="0"/>
+                <a:cs typeface="Arial" panose="020B0604020202020204" pitchFamily="34" charset="0"/>
+              </a:rPr>
+              <a:t>date:</a:t>
+            </a:r>
+            <a:r>
+              <a:rPr lang="en-US" sz="1200" dirty="0">
+                <a:latin typeface="Arial" panose="020B0604020202020204" pitchFamily="34" charset="0"/>
+                <a:cs typeface="Arial" panose="020B0604020202020204" pitchFamily="34" charset="0"/>
+              </a:rPr>
               <a:t>2021-06-30</a:t>
             </a:r>
-            <a:endParaRPr dirty="0"/>
+          </a:p>
+          <a:p>
+            <a:r>
+              <a:rPr lang="en-US" sz="1200" dirty="0" err="1">
+                <a:latin typeface="Arial" panose="020B0604020202020204" pitchFamily="34" charset="0"/>
+                <a:cs typeface="Arial" panose="020B0604020202020204" pitchFamily="34" charset="0"/>
+              </a:rPr>
+              <a:t>meetTime</a:t>
+            </a:r>
+            <a:r>
+              <a:rPr lang="en-US" sz="1200" dirty="0">
+                <a:latin typeface="Arial" panose="020B0604020202020204" pitchFamily="34" charset="0"/>
+                <a:cs typeface="Arial" panose="020B0604020202020204" pitchFamily="34" charset="0"/>
+              </a:rPr>
+              <a:t>: </a:t>
+            </a:r>
+            <a:r>
+              <a:rPr lang="en-US" altLang="zh-CN" sz="1200" b="0" i="0" dirty="0">
+                <a:solidFill>
+                  <a:srgbClr val="24292F"/>
+                </a:solidFill>
+                <a:effectLst/>
+                <a:latin typeface="Arial" panose="020B0604020202020204" pitchFamily="34" charset="0"/>
+                <a:cs typeface="Arial" panose="020B0604020202020204" pitchFamily="34" charset="0"/>
+              </a:rPr>
+              <a:t>1986-10-21 21:08:31.521</a:t>
+            </a:r>
+          </a:p>
+          <a:p>
+            <a:r>
+              <a:rPr lang="en-US" sz="1200" dirty="0" err="1">
+                <a:latin typeface="Arial" panose="020B0604020202020204" pitchFamily="34" charset="0"/>
+                <a:cs typeface="Arial" panose="020B0604020202020204" pitchFamily="34" charset="0"/>
+              </a:rPr>
+              <a:t>meetTime</a:t>
+            </a:r>
+            <a:r>
+              <a:rPr lang="en-US" sz="1200" dirty="0">
+                <a:latin typeface="Arial" panose="020B0604020202020204" pitchFamily="34" charset="0"/>
+                <a:cs typeface="Arial" panose="020B0604020202020204" pitchFamily="34" charset="0"/>
+              </a:rPr>
+              <a:t>: </a:t>
+            </a:r>
+            <a:r>
+              <a:rPr lang="en-US" altLang="zh-CN" sz="1200" b="0" i="0" dirty="0">
+                <a:solidFill>
+                  <a:srgbClr val="24292F"/>
+                </a:solidFill>
+                <a:effectLst/>
+                <a:latin typeface="Arial" panose="020B0604020202020204" pitchFamily="34" charset="0"/>
+                <a:cs typeface="Arial" panose="020B0604020202020204" pitchFamily="34" charset="0"/>
+              </a:rPr>
+              <a:t>1946-08-25 19:07:22</a:t>
+            </a:r>
+            <a:endParaRPr lang="en-US" sz="1200" dirty="0">
+              <a:latin typeface="Arial" panose="020B0604020202020204" pitchFamily="34" charset="0"/>
+              <a:cs typeface="Arial" panose="020B0604020202020204" pitchFamily="34" charset="0"/>
+            </a:endParaRPr>
           </a:p>
         </p:txBody>
       </p:sp>
@@ -4033,7 +4259,7 @@
           </a:ln>
           <a:extLst>
             <a:ext uri="{C572A759-6A51-4108-AA02-DFA0A04FC94B}">
-              <ma14:wrappingTextBoxFlag xmlns="" xmlns:m="http://schemas.openxmlformats.org/officeDocument/2006/math" xmlns:a14="http://schemas.microsoft.com/office/drawing/2010/main" xmlns:ma14="http://schemas.microsoft.com/office/mac/drawingml/2011/main" val="1"/>
+              <ma14:wrappingTextBoxFlag xmlns:ma14="http://schemas.microsoft.com/office/mac/drawingml/2011/main" xmlns:a14="http://schemas.microsoft.com/office/drawing/2010/main" xmlns:m="http://schemas.openxmlformats.org/officeDocument/2006/math" xmlns="" val="1"/>
             </a:ext>
           </a:extLst>
         </p:spPr>
@@ -4063,8 +4289,8 @@
         </p:nvSpPr>
         <p:spPr>
           <a:xfrm rot="19247809">
-            <a:off x="4105432" y="1682136"/>
-            <a:ext cx="1304927" cy="353939"/>
+            <a:off x="3140589" y="1549690"/>
+            <a:ext cx="1865686" cy="1015659"/>
           </a:xfrm>
           <a:prstGeom prst="rect">
             <a:avLst/>
@@ -4074,12 +4300,12 @@
           </a:ln>
           <a:extLst>
             <a:ext uri="{C572A759-6A51-4108-AA02-DFA0A04FC94B}">
-              <ma14:wrappingTextBoxFlag xmlns="" xmlns:m="http://schemas.openxmlformats.org/officeDocument/2006/math" xmlns:a14="http://schemas.microsoft.com/office/drawing/2010/main" xmlns:ma14="http://schemas.microsoft.com/office/mac/drawingml/2011/main" val="1"/>
+              <ma14:wrappingTextBoxFlag xmlns:ma14="http://schemas.microsoft.com/office/mac/drawingml/2011/main" xmlns:a14="http://schemas.microsoft.com/office/drawing/2010/main" xmlns:m="http://schemas.openxmlformats.org/officeDocument/2006/math" xmlns="" val="1"/>
             </a:ext>
           </a:extLst>
         </p:spPr>
         <p:txBody>
-          <a:bodyPr lIns="45718" tIns="45718" rIns="45718" bIns="45718">
+          <a:bodyPr wrap="square" lIns="45718" tIns="45718" rIns="45718" bIns="45718">
             <a:spAutoFit/>
           </a:bodyPr>
           <a:lstStyle>
@@ -4089,10 +4315,79 @@
           </a:lstStyle>
           <a:p>
             <a:r>
-              <a:rPr lang="en-US" dirty="0"/>
-              <a:t>1950-05-14</a:t>
-            </a:r>
-            <a:endParaRPr dirty="0"/>
+              <a:rPr lang="en-US" sz="1200" dirty="0">
+                <a:latin typeface="Arial" panose="020B0604020202020204" pitchFamily="34" charset="0"/>
+                <a:cs typeface="Arial" panose="020B0604020202020204" pitchFamily="34" charset="0"/>
+              </a:rPr>
+              <a:t>Date: 1950-05-14</a:t>
+            </a:r>
+          </a:p>
+          <a:p>
+            <a:r>
+              <a:rPr lang="en-US" sz="1200" dirty="0" err="1">
+                <a:latin typeface="Arial" panose="020B0604020202020204" pitchFamily="34" charset="0"/>
+                <a:cs typeface="Arial" panose="020B0604020202020204" pitchFamily="34" charset="0"/>
+              </a:rPr>
+              <a:t>meetTime</a:t>
+            </a:r>
+            <a:r>
+              <a:rPr lang="en-US" sz="1200" dirty="0">
+                <a:latin typeface="Arial" panose="020B0604020202020204" pitchFamily="34" charset="0"/>
+                <a:cs typeface="Arial" panose="020B0604020202020204" pitchFamily="34" charset="0"/>
+              </a:rPr>
+              <a:t>: </a:t>
+            </a:r>
+            <a:r>
+              <a:rPr lang="en-US" altLang="zh-CN" sz="1200" b="0" i="0" dirty="0">
+                <a:solidFill>
+                  <a:srgbClr val="24292F"/>
+                </a:solidFill>
+                <a:effectLst/>
+                <a:latin typeface="Arial" panose="020B0604020202020204" pitchFamily="34" charset="0"/>
+                <a:cs typeface="Arial" panose="020B0604020202020204" pitchFamily="34" charset="0"/>
+              </a:rPr>
+              <a:t>1946-08-25 19:07:22</a:t>
+            </a:r>
+          </a:p>
+          <a:p>
+            <a:r>
+              <a:rPr lang="en-US" sz="1200" dirty="0" err="1">
+                <a:solidFill>
+                  <a:srgbClr val="24292F"/>
+                </a:solidFill>
+                <a:latin typeface="Arial" panose="020B0604020202020204" pitchFamily="34" charset="0"/>
+                <a:cs typeface="Arial" panose="020B0604020202020204" pitchFamily="34" charset="0"/>
+              </a:rPr>
+              <a:t>meetTime</a:t>
+            </a:r>
+            <a:r>
+              <a:rPr lang="en-US" sz="1200" dirty="0">
+                <a:solidFill>
+                  <a:srgbClr val="24292F"/>
+                </a:solidFill>
+                <a:latin typeface="Arial" panose="020B0604020202020204" pitchFamily="34" charset="0"/>
+                <a:cs typeface="Arial" panose="020B0604020202020204" pitchFamily="34" charset="0"/>
+              </a:rPr>
+              <a:t>: </a:t>
+            </a:r>
+            <a:r>
+              <a:rPr lang="en-US" altLang="zh-CN" sz="1200" b="0" i="0" dirty="0">
+                <a:solidFill>
+                  <a:srgbClr val="24292F"/>
+                </a:solidFill>
+                <a:effectLst/>
+                <a:latin typeface="Arial" panose="020B0604020202020204" pitchFamily="34" charset="0"/>
+                <a:cs typeface="Arial" panose="020B0604020202020204" pitchFamily="34" charset="0"/>
+              </a:rPr>
+              <a:t>2007-02-12 12:11:42.123</a:t>
+            </a:r>
+            <a:r>
+              <a:rPr lang="en-US" sz="1200" dirty="0">
+                <a:latin typeface="Arial" panose="020B0604020202020204" pitchFamily="34" charset="0"/>
+                <a:cs typeface="Arial" panose="020B0604020202020204" pitchFamily="34" charset="0"/>
+              </a:rPr>
+              <a:t> </a:t>
+            </a:r>
           </a:p>
         </p:txBody>
       </p:sp>
@@ -4135,8 +4430,8 @@
         </p:nvSpPr>
         <p:spPr>
           <a:xfrm>
-            <a:off x="3465183" y="3153685"/>
-            <a:ext cx="1304926" cy="353939"/>
+            <a:off x="2957483" y="2756605"/>
+            <a:ext cx="2016670" cy="1015659"/>
           </a:xfrm>
           <a:prstGeom prst="rect">
             <a:avLst/>
@@ -4146,7 +4441,121 @@
           </a:ln>
           <a:extLst>
             <a:ext uri="{C572A759-6A51-4108-AA02-DFA0A04FC94B}">
-              <ma14:wrappingTextBoxFlag xmlns="" xmlns:m="http://schemas.openxmlformats.org/officeDocument/2006/math" xmlns:a14="http://schemas.microsoft.com/office/drawing/2010/main" xmlns:ma14="http://schemas.microsoft.com/office/mac/drawingml/2011/main" val="1"/>
+              <ma14:wrappingTextBoxFlag xmlns:ma14="http://schemas.microsoft.com/office/mac/drawingml/2011/main" xmlns:a14="http://schemas.microsoft.com/office/drawing/2010/main" xmlns:m="http://schemas.openxmlformats.org/officeDocument/2006/math" xmlns="" val="1"/>
+            </a:ext>
+          </a:extLst>
+        </p:spPr>
+        <p:txBody>
+          <a:bodyPr wrap="square" lIns="45718" tIns="45718" rIns="45718" bIns="45718">
+            <a:spAutoFit/>
+          </a:bodyPr>
+          <a:lstStyle>
+            <a:lvl1pPr algn="ctr">
+              <a:defRPr sz="1700"/>
+            </a:lvl1pPr>
+          </a:lstStyle>
+          <a:p>
+            <a:r>
+              <a:rPr lang="en-US" altLang="zh-CN" sz="1200" dirty="0">
+                <a:latin typeface="Arial" panose="020B0604020202020204" pitchFamily="34" charset="0"/>
+                <a:cs typeface="Arial" panose="020B0604020202020204" pitchFamily="34" charset="0"/>
+              </a:rPr>
+              <a:t>d</a:t>
+            </a:r>
+            <a:r>
+              <a:rPr lang="en-US" sz="1200" dirty="0">
+                <a:latin typeface="Arial" panose="020B0604020202020204" pitchFamily="34" charset="0"/>
+                <a:cs typeface="Arial" panose="020B0604020202020204" pitchFamily="34" charset="0"/>
+              </a:rPr>
+              <a:t>ate: 1950-05-14</a:t>
+            </a:r>
+          </a:p>
+          <a:p>
+            <a:r>
+              <a:rPr lang="en-US" sz="1200" dirty="0" err="1">
+                <a:latin typeface="Arial" panose="020B0604020202020204" pitchFamily="34" charset="0"/>
+                <a:cs typeface="Arial" panose="020B0604020202020204" pitchFamily="34" charset="0"/>
+              </a:rPr>
+              <a:t>meetTime</a:t>
+            </a:r>
+            <a:r>
+              <a:rPr lang="en-US" sz="1200" dirty="0">
+                <a:latin typeface="Arial" panose="020B0604020202020204" pitchFamily="34" charset="0"/>
+                <a:cs typeface="Arial" panose="020B0604020202020204" pitchFamily="34" charset="0"/>
+              </a:rPr>
+              <a:t>: </a:t>
+            </a:r>
+            <a:r>
+              <a:rPr lang="en-US" altLang="zh-CN" sz="1200" b="0" i="0" dirty="0">
+                <a:solidFill>
+                  <a:srgbClr val="24292F"/>
+                </a:solidFill>
+                <a:effectLst/>
+                <a:latin typeface="Arial" panose="020B0604020202020204" pitchFamily="34" charset="0"/>
+                <a:cs typeface="Arial" panose="020B0604020202020204" pitchFamily="34" charset="0"/>
+              </a:rPr>
+              <a:t>2012-12-11 20:07:22</a:t>
+            </a:r>
+          </a:p>
+          <a:p>
+            <a:r>
+              <a:rPr lang="en-US" sz="1200" dirty="0" err="1">
+                <a:solidFill>
+                  <a:srgbClr val="24292F"/>
+                </a:solidFill>
+                <a:latin typeface="Arial" panose="020B0604020202020204" pitchFamily="34" charset="0"/>
+                <a:cs typeface="Arial" panose="020B0604020202020204" pitchFamily="34" charset="0"/>
+              </a:rPr>
+              <a:t>meetTime</a:t>
+            </a:r>
+            <a:r>
+              <a:rPr lang="en-US" sz="1200" dirty="0">
+                <a:solidFill>
+                  <a:srgbClr val="24292F"/>
+                </a:solidFill>
+                <a:latin typeface="Arial" panose="020B0604020202020204" pitchFamily="34" charset="0"/>
+                <a:cs typeface="Arial" panose="020B0604020202020204" pitchFamily="34" charset="0"/>
+              </a:rPr>
+              <a:t>: </a:t>
+            </a:r>
+            <a:r>
+              <a:rPr lang="en-US" altLang="zh-CN" sz="1200" b="0" i="0" dirty="0">
+                <a:solidFill>
+                  <a:srgbClr val="24292F"/>
+                </a:solidFill>
+                <a:effectLst/>
+                <a:latin typeface="Arial" panose="020B0604020202020204" pitchFamily="34" charset="0"/>
+                <a:cs typeface="Arial" panose="020B0604020202020204" pitchFamily="34" charset="0"/>
+              </a:rPr>
+              <a:t>1982-11-11 13:12:05.123</a:t>
+            </a:r>
+            <a:endParaRPr sz="1200" dirty="0">
+              <a:latin typeface="Arial" panose="020B0604020202020204" pitchFamily="34" charset="0"/>
+              <a:cs typeface="Arial" panose="020B0604020202020204" pitchFamily="34" charset="0"/>
+            </a:endParaRPr>
+          </a:p>
+        </p:txBody>
+      </p:sp>
+      <p:sp>
+        <p:nvSpPr>
+          <p:cNvPr id="144" name="TextBox 37"/>
+          <p:cNvSpPr txBox="1"/>
+          <p:nvPr/>
+        </p:nvSpPr>
+        <p:spPr>
+          <a:xfrm>
+            <a:off x="9954792" y="2630054"/>
+            <a:ext cx="2100265" cy="492438"/>
+          </a:xfrm>
+          <a:prstGeom prst="rect">
+            <a:avLst/>
+          </a:prstGeom>
+          <a:ln w="12700">
+            <a:miter lim="400000"/>
+          </a:ln>
+          <a:extLst>
+            <a:ext uri="{C572A759-6A51-4108-AA02-DFA0A04FC94B}">
+              <ma14:wrappingTextBoxFlag xmlns:ma14="http://schemas.microsoft.com/office/mac/drawingml/2011/main" xmlns:a14="http://schemas.microsoft.com/office/drawing/2010/main" xmlns:m="http://schemas.openxmlformats.org/officeDocument/2006/math" xmlns="" val="1"/>
             </a:ext>
           </a:extLst>
         </p:spPr>
@@ -4160,50 +4569,47 @@
             </a:lvl1pPr>
           </a:lstStyle>
           <a:p>
-            <a:r>
-              <a:rPr lang="en-US" dirty="0"/>
-              <a:t>1950-05-14</a:t>
-            </a:r>
-            <a:endParaRPr dirty="0"/>
-          </a:p>
-        </p:txBody>
-      </p:sp>
-      <p:sp>
-        <p:nvSpPr>
-          <p:cNvPr id="144" name="TextBox 37"/>
-          <p:cNvSpPr txBox="1"/>
-          <p:nvPr/>
-        </p:nvSpPr>
-        <p:spPr>
-          <a:xfrm>
-            <a:off x="9734580" y="2651980"/>
-            <a:ext cx="2100265" cy="345439"/>
-          </a:xfrm>
-          <a:prstGeom prst="rect">
-            <a:avLst/>
-          </a:prstGeom>
-          <a:ln w="12700">
-            <a:miter lim="400000"/>
-          </a:ln>
-          <a:extLst>
-            <a:ext uri="{C572A759-6A51-4108-AA02-DFA0A04FC94B}">
-              <ma14:wrappingTextBoxFlag xmlns="" xmlns:m="http://schemas.openxmlformats.org/officeDocument/2006/math" xmlns:a14="http://schemas.microsoft.com/office/drawing/2010/main" xmlns:ma14="http://schemas.microsoft.com/office/mac/drawingml/2011/main" val="1"/>
-            </a:ext>
-          </a:extLst>
-        </p:spPr>
-        <p:txBody>
-          <a:bodyPr lIns="45718" tIns="45718" rIns="45718" bIns="45718">
-            <a:spAutoFit/>
-          </a:bodyPr>
-          <a:lstStyle>
-            <a:lvl1pPr algn="ctr">
-              <a:defRPr sz="1700"/>
-            </a:lvl1pPr>
-          </a:lstStyle>
-          <a:p>
-            <a:r>
-              <a:t>Numbers are “date”</a:t>
-            </a:r>
+            <a:pPr algn="l"/>
+            <a:r>
+              <a:rPr lang="en-US" sz="1300" dirty="0">
+                <a:solidFill>
+                  <a:srgbClr val="548235"/>
+                </a:solidFill>
+                <a:latin typeface="Arial" panose="020B0604020202020204" pitchFamily="34" charset="0"/>
+                <a:cs typeface="Arial" panose="020B0604020202020204" pitchFamily="34" charset="0"/>
+              </a:rPr>
+              <a:t>date: Date</a:t>
+            </a:r>
+          </a:p>
+          <a:p>
+            <a:pPr algn="l"/>
+            <a:r>
+              <a:rPr lang="en-US" sz="1300" dirty="0" err="1">
+                <a:solidFill>
+                  <a:srgbClr val="548235"/>
+                </a:solidFill>
+                <a:latin typeface="Arial" panose="020B0604020202020204" pitchFamily="34" charset="0"/>
+                <a:cs typeface="Arial" panose="020B0604020202020204" pitchFamily="34" charset="0"/>
+              </a:rPr>
+              <a:t>meetTime</a:t>
+            </a:r>
+            <a:r>
+              <a:rPr lang="en-US" sz="1300" dirty="0">
+                <a:solidFill>
+                  <a:srgbClr val="548235"/>
+                </a:solidFill>
+                <a:latin typeface="Arial" panose="020B0604020202020204" pitchFamily="34" charset="0"/>
+                <a:cs typeface="Arial" panose="020B0604020202020204" pitchFamily="34" charset="0"/>
+              </a:rPr>
+              <a:t>: Timestamp </a:t>
+            </a:r>
+            <a:endParaRPr sz="1300" dirty="0">
+              <a:solidFill>
+                <a:srgbClr val="548235"/>
+              </a:solidFill>
+              <a:latin typeface="Arial" panose="020B0604020202020204" pitchFamily="34" charset="0"/>
+              <a:cs typeface="Arial" panose="020B0604020202020204" pitchFamily="34" charset="0"/>
+            </a:endParaRPr>
           </a:p>
         </p:txBody>
       </p:sp>
@@ -4286,7 +4692,7 @@
             <a:effectLst/>
             <a:extLst>
               <a:ext uri="{C572A759-6A51-4108-AA02-DFA0A04FC94B}">
-                <ma14:wrappingTextBoxFlag xmlns="" xmlns:m="http://schemas.openxmlformats.org/officeDocument/2006/math" xmlns:a14="http://schemas.microsoft.com/office/drawing/2010/main" xmlns:ma14="http://schemas.microsoft.com/office/mac/drawingml/2011/main" val="1"/>
+                <ma14:wrappingTextBoxFlag xmlns:ma14="http://schemas.microsoft.com/office/mac/drawingml/2011/main" xmlns:a14="http://schemas.microsoft.com/office/drawing/2010/main" xmlns:m="http://schemas.openxmlformats.org/officeDocument/2006/math" xmlns="" val="1"/>
               </a:ext>
             </a:extLst>
           </p:spPr>
@@ -4379,8 +4785,8 @@
         </p:nvSpPr>
         <p:spPr>
           <a:xfrm rot="1924601">
-            <a:off x="4260451" y="4668276"/>
-            <a:ext cx="1304927" cy="353939"/>
+            <a:off x="4322217" y="4484393"/>
+            <a:ext cx="2064350" cy="646327"/>
           </a:xfrm>
           <a:prstGeom prst="rect">
             <a:avLst/>
@@ -4390,7 +4796,81 @@
           </a:ln>
           <a:extLst>
             <a:ext uri="{C572A759-6A51-4108-AA02-DFA0A04FC94B}">
-              <ma14:wrappingTextBoxFlag xmlns="" xmlns:m="http://schemas.openxmlformats.org/officeDocument/2006/math" xmlns:a14="http://schemas.microsoft.com/office/drawing/2010/main" xmlns:ma14="http://schemas.microsoft.com/office/mac/drawingml/2011/main" val="1"/>
+              <ma14:wrappingTextBoxFlag xmlns:ma14="http://schemas.microsoft.com/office/mac/drawingml/2011/main" xmlns:a14="http://schemas.microsoft.com/office/drawing/2010/main" xmlns:m="http://schemas.openxmlformats.org/officeDocument/2006/math" xmlns="" val="1"/>
+            </a:ext>
+          </a:extLst>
+        </p:spPr>
+        <p:txBody>
+          <a:bodyPr wrap="square" lIns="45718" tIns="45718" rIns="45718" bIns="45718">
+            <a:spAutoFit/>
+          </a:bodyPr>
+          <a:lstStyle>
+            <a:lvl1pPr algn="ctr">
+              <a:defRPr sz="1700"/>
+            </a:lvl1pPr>
+          </a:lstStyle>
+          <a:p>
+            <a:r>
+              <a:rPr lang="en-US" sz="1200" dirty="0">
+                <a:latin typeface="Arial" panose="020B0604020202020204" pitchFamily="34" charset="0"/>
+                <a:cs typeface="Arial" panose="020B0604020202020204" pitchFamily="34" charset="0"/>
+              </a:rPr>
+              <a:t>date: 1905-12-12</a:t>
+            </a:r>
+          </a:p>
+          <a:p>
+            <a:r>
+              <a:rPr lang="en-US" sz="1200" dirty="0" err="1">
+                <a:latin typeface="Arial" panose="020B0604020202020204" pitchFamily="34" charset="0"/>
+                <a:cs typeface="Arial" panose="020B0604020202020204" pitchFamily="34" charset="0"/>
+              </a:rPr>
+              <a:t>meetTime</a:t>
+            </a:r>
+            <a:r>
+              <a:rPr lang="en-US" sz="1200" dirty="0">
+                <a:latin typeface="Arial" panose="020B0604020202020204" pitchFamily="34" charset="0"/>
+                <a:cs typeface="Arial" panose="020B0604020202020204" pitchFamily="34" charset="0"/>
+              </a:rPr>
+              <a:t>: </a:t>
+            </a:r>
+            <a:r>
+              <a:rPr lang="en-US" altLang="zh-CN" sz="1200" b="0" i="0" dirty="0">
+                <a:solidFill>
+                  <a:srgbClr val="24292F"/>
+                </a:solidFill>
+                <a:effectLst/>
+                <a:latin typeface="Arial" panose="020B0604020202020204" pitchFamily="34" charset="0"/>
+                <a:cs typeface="Arial" panose="020B0604020202020204" pitchFamily="34" charset="0"/>
+              </a:rPr>
+              <a:t>2020-03-01 12:11:41.6552</a:t>
+            </a:r>
+            <a:endParaRPr sz="1200" dirty="0">
+              <a:latin typeface="Arial" panose="020B0604020202020204" pitchFamily="34" charset="0"/>
+              <a:cs typeface="Arial" panose="020B0604020202020204" pitchFamily="34" charset="0"/>
+            </a:endParaRPr>
+          </a:p>
+        </p:txBody>
+      </p:sp>
+      <p:sp>
+        <p:nvSpPr>
+          <p:cNvPr id="151" name="TextBox 52"/>
+          <p:cNvSpPr txBox="1"/>
+          <p:nvPr/>
+        </p:nvSpPr>
+        <p:spPr>
+          <a:xfrm rot="18650982">
+            <a:off x="2627311" y="4922381"/>
+            <a:ext cx="1304926" cy="830993"/>
+          </a:xfrm>
+          <a:prstGeom prst="rect">
+            <a:avLst/>
+          </a:prstGeom>
+          <a:ln w="12700">
+            <a:miter lim="400000"/>
+          </a:ln>
+          <a:extLst>
+            <a:ext uri="{C572A759-6A51-4108-AA02-DFA0A04FC94B}">
+              <ma14:wrappingTextBoxFlag xmlns:ma14="http://schemas.microsoft.com/office/mac/drawingml/2011/main" xmlns:a14="http://schemas.microsoft.com/office/drawing/2010/main" xmlns:m="http://schemas.openxmlformats.org/officeDocument/2006/math" xmlns="" val="1"/>
             </a:ext>
           </a:extLst>
         </p:spPr>
@@ -4405,51 +4885,43 @@
           </a:lstStyle>
           <a:p>
             <a:r>
-              <a:rPr lang="en-US" dirty="0"/>
-              <a:t>1905-12-12</a:t>
-            </a:r>
-            <a:endParaRPr dirty="0"/>
-          </a:p>
-        </p:txBody>
-      </p:sp>
-      <p:sp>
-        <p:nvSpPr>
-          <p:cNvPr id="151" name="TextBox 52"/>
-          <p:cNvSpPr txBox="1"/>
-          <p:nvPr/>
-        </p:nvSpPr>
-        <p:spPr>
-          <a:xfrm rot="18650982">
-            <a:off x="2524411" y="4868430"/>
-            <a:ext cx="1304926" cy="353939"/>
-          </a:xfrm>
-          <a:prstGeom prst="rect">
-            <a:avLst/>
-          </a:prstGeom>
-          <a:ln w="12700">
-            <a:miter lim="400000"/>
-          </a:ln>
-          <a:extLst>
-            <a:ext uri="{C572A759-6A51-4108-AA02-DFA0A04FC94B}">
-              <ma14:wrappingTextBoxFlag xmlns="" xmlns:m="http://schemas.openxmlformats.org/officeDocument/2006/math" xmlns:a14="http://schemas.microsoft.com/office/drawing/2010/main" xmlns:ma14="http://schemas.microsoft.com/office/mac/drawingml/2011/main" val="1"/>
-            </a:ext>
-          </a:extLst>
-        </p:spPr>
-        <p:txBody>
-          <a:bodyPr lIns="45718" tIns="45718" rIns="45718" bIns="45718">
-            <a:spAutoFit/>
-          </a:bodyPr>
-          <a:lstStyle>
-            <a:lvl1pPr algn="ctr">
-              <a:defRPr sz="1700"/>
-            </a:lvl1pPr>
-          </a:lstStyle>
-          <a:p>
-            <a:r>
-              <a:rPr lang="en-US" dirty="0"/>
-              <a:t>1905-12-12</a:t>
-            </a:r>
-            <a:endParaRPr dirty="0"/>
+              <a:rPr lang="en-US" sz="1200" dirty="0">
+                <a:latin typeface="Arial" panose="020B0604020202020204" pitchFamily="34" charset="0"/>
+                <a:cs typeface="Arial" panose="020B0604020202020204" pitchFamily="34" charset="0"/>
+              </a:rPr>
+              <a:t>date: 1905-12-12</a:t>
+            </a:r>
+          </a:p>
+          <a:p>
+            <a:r>
+              <a:rPr lang="en-US" sz="1200" dirty="0" err="1">
+                <a:latin typeface="Arial" panose="020B0604020202020204" pitchFamily="34" charset="0"/>
+                <a:cs typeface="Arial" panose="020B0604020202020204" pitchFamily="34" charset="0"/>
+              </a:rPr>
+              <a:t>meetTime</a:t>
+            </a:r>
+            <a:r>
+              <a:rPr lang="en-US" sz="1200" dirty="0">
+                <a:latin typeface="Arial" panose="020B0604020202020204" pitchFamily="34" charset="0"/>
+                <a:cs typeface="Arial" panose="020B0604020202020204" pitchFamily="34" charset="0"/>
+              </a:rPr>
+              <a:t>: </a:t>
+            </a:r>
+            <a:r>
+              <a:rPr lang="en-US" altLang="zh-CN" sz="1200" b="0" i="0" dirty="0">
+                <a:solidFill>
+                  <a:srgbClr val="24292F"/>
+                </a:solidFill>
+                <a:effectLst/>
+                <a:latin typeface="Arial" panose="020B0604020202020204" pitchFamily="34" charset="0"/>
+                <a:cs typeface="Arial" panose="020B0604020202020204" pitchFamily="34" charset="0"/>
+              </a:rPr>
+              <a:t>2025-01-01 11:22:33.52</a:t>
+            </a:r>
+            <a:endParaRPr sz="1200" dirty="0">
+              <a:latin typeface="Arial" panose="020B0604020202020204" pitchFamily="34" charset="0"/>
+              <a:cs typeface="Arial" panose="020B0604020202020204" pitchFamily="34" charset="0"/>
+            </a:endParaRPr>
           </a:p>
         </p:txBody>
       </p:sp>
@@ -4532,7 +5004,7 @@
             <a:effectLst/>
             <a:extLst>
               <a:ext uri="{C572A759-6A51-4108-AA02-DFA0A04FC94B}">
-                <ma14:wrappingTextBoxFlag xmlns="" xmlns:m="http://schemas.openxmlformats.org/officeDocument/2006/math" xmlns:a14="http://schemas.microsoft.com/office/drawing/2010/main" xmlns:ma14="http://schemas.microsoft.com/office/mac/drawingml/2011/main" val="1"/>
+                <ma14:wrappingTextBoxFlag xmlns:ma14="http://schemas.microsoft.com/office/mac/drawingml/2011/main" xmlns:a14="http://schemas.microsoft.com/office/drawing/2010/main" xmlns:m="http://schemas.openxmlformats.org/officeDocument/2006/math" xmlns="" val="1"/>
               </a:ext>
             </a:extLst>
           </p:spPr>
@@ -4636,7 +5108,7 @@
             <a:effectLst/>
             <a:extLst>
               <a:ext uri="{C572A759-6A51-4108-AA02-DFA0A04FC94B}">
-                <ma14:wrappingTextBoxFlag xmlns="" xmlns:m="http://schemas.openxmlformats.org/officeDocument/2006/math" xmlns:a14="http://schemas.microsoft.com/office/drawing/2010/main" xmlns:ma14="http://schemas.microsoft.com/office/mac/drawingml/2011/main" val="1"/>
+                <ma14:wrappingTextBoxFlag xmlns:ma14="http://schemas.microsoft.com/office/mac/drawingml/2011/main" xmlns:a14="http://schemas.microsoft.com/office/drawing/2010/main" xmlns:m="http://schemas.openxmlformats.org/officeDocument/2006/math" xmlns="" val="1"/>
               </a:ext>
             </a:extLst>
           </p:spPr>
@@ -4740,7 +5212,7 @@
             <a:effectLst/>
             <a:extLst>
               <a:ext uri="{C572A759-6A51-4108-AA02-DFA0A04FC94B}">
-                <ma14:wrappingTextBoxFlag xmlns="" xmlns:m="http://schemas.openxmlformats.org/officeDocument/2006/math" xmlns:a14="http://schemas.microsoft.com/office/drawing/2010/main" xmlns:ma14="http://schemas.microsoft.com/office/mac/drawingml/2011/main" val="1"/>
+                <ma14:wrappingTextBoxFlag xmlns:ma14="http://schemas.microsoft.com/office/mac/drawingml/2011/main" xmlns:a14="http://schemas.microsoft.com/office/drawing/2010/main" xmlns:m="http://schemas.openxmlformats.org/officeDocument/2006/math" xmlns="" val="1"/>
               </a:ext>
             </a:extLst>
           </p:spPr>
@@ -4773,7 +5245,7 @@
         </p:nvSpPr>
         <p:spPr>
           <a:xfrm>
-            <a:off x="7959825" y="1163984"/>
+            <a:off x="7950056" y="794411"/>
             <a:ext cx="381003" cy="381003"/>
           </a:xfrm>
           <a:prstGeom prst="ellipse">
@@ -4851,7 +5323,7 @@
         </p:nvSpPr>
         <p:spPr>
           <a:xfrm>
-            <a:off x="8682066" y="2524486"/>
+            <a:off x="8664153" y="2603636"/>
             <a:ext cx="928689" cy="358139"/>
           </a:xfrm>
           <a:prstGeom prst="rect">
@@ -4862,7 +5334,7 @@
           </a:ln>
           <a:extLst>
             <a:ext uri="{C572A759-6A51-4108-AA02-DFA0A04FC94B}">
-              <ma14:wrappingTextBoxFlag xmlns="" xmlns:m="http://schemas.openxmlformats.org/officeDocument/2006/math" xmlns:a14="http://schemas.microsoft.com/office/drawing/2010/main" xmlns:ma14="http://schemas.microsoft.com/office/mac/drawingml/2011/main" val="1"/>
+              <ma14:wrappingTextBoxFlag xmlns:ma14="http://schemas.microsoft.com/office/mac/drawingml/2011/main" xmlns:a14="http://schemas.microsoft.com/office/drawing/2010/main" xmlns:m="http://schemas.openxmlformats.org/officeDocument/2006/math" xmlns="" val="1"/>
             </a:ext>
           </a:extLst>
         </p:spPr>
@@ -4873,6 +5345,7 @@
           <a:lstStyle/>
           <a:p>
             <a:r>
+              <a:rPr dirty="0"/>
               <a:t>KNOWS</a:t>
             </a:r>
           </a:p>
@@ -4897,7 +5370,7 @@
           </a:ln>
           <a:extLst>
             <a:ext uri="{C572A759-6A51-4108-AA02-DFA0A04FC94B}">
-              <ma14:wrappingTextBoxFlag xmlns="" xmlns:m="http://schemas.openxmlformats.org/officeDocument/2006/math" xmlns:a14="http://schemas.microsoft.com/office/drawing/2010/main" xmlns:ma14="http://schemas.microsoft.com/office/mac/drawingml/2011/main" val="1"/>
+              <ma14:wrappingTextBoxFlag xmlns:ma14="http://schemas.microsoft.com/office/mac/drawingml/2011/main" xmlns:a14="http://schemas.microsoft.com/office/drawing/2010/main" xmlns:m="http://schemas.openxmlformats.org/officeDocument/2006/math" xmlns="" val="1"/>
             </a:ext>
           </a:extLst>
         </p:spPr>
@@ -4908,6 +5381,7 @@
           <a:lstStyle/>
           <a:p>
             <a:r>
+              <a:rPr dirty="0"/>
               <a:t>ORGANIZATION</a:t>
             </a:r>
           </a:p>
@@ -4962,7 +5436,7 @@
           </a:ln>
           <a:extLst>
             <a:ext uri="{C572A759-6A51-4108-AA02-DFA0A04FC94B}">
-              <ma14:wrappingTextBoxFlag xmlns="" xmlns:m="http://schemas.openxmlformats.org/officeDocument/2006/math" xmlns:a14="http://schemas.microsoft.com/office/drawing/2010/main" xmlns:ma14="http://schemas.microsoft.com/office/mac/drawingml/2011/main" val="1"/>
+              <ma14:wrappingTextBoxFlag xmlns:ma14="http://schemas.microsoft.com/office/mac/drawingml/2011/main" xmlns:a14="http://schemas.microsoft.com/office/drawing/2010/main" xmlns:m="http://schemas.openxmlformats.org/officeDocument/2006/math" xmlns="" val="1"/>
             </a:ext>
           </a:extLst>
         </p:spPr>
@@ -5030,7 +5504,7 @@
           </a:ln>
           <a:extLst>
             <a:ext uri="{C572A759-6A51-4108-AA02-DFA0A04FC94B}">
-              <ma14:wrappingTextBoxFlag xmlns="" xmlns:m="http://schemas.openxmlformats.org/officeDocument/2006/math" xmlns:a14="http://schemas.microsoft.com/office/drawing/2010/main" xmlns:ma14="http://schemas.microsoft.com/office/mac/drawingml/2011/main" val="1"/>
+              <ma14:wrappingTextBoxFlag xmlns:ma14="http://schemas.microsoft.com/office/mac/drawingml/2011/main" xmlns:a14="http://schemas.microsoft.com/office/drawing/2010/main" xmlns:m="http://schemas.openxmlformats.org/officeDocument/2006/math" xmlns="" val="1"/>
             </a:ext>
           </a:extLst>
         </p:spPr>
@@ -5043,6 +5517,7 @@
           </a:lstStyle>
           <a:p>
             <a:r>
+              <a:rPr dirty="0"/>
               <a:t>STUDYAT</a:t>
             </a:r>
           </a:p>
@@ -5056,8 +5531,8 @@
         </p:nvSpPr>
         <p:spPr>
           <a:xfrm>
-            <a:off x="9710801" y="3262962"/>
-            <a:ext cx="2100264" cy="345439"/>
+            <a:off x="9972705" y="3241756"/>
+            <a:ext cx="2100264" cy="292384"/>
           </a:xfrm>
           <a:prstGeom prst="rect">
             <a:avLst/>
@@ -5067,7 +5542,7 @@
           </a:ln>
           <a:extLst>
             <a:ext uri="{C572A759-6A51-4108-AA02-DFA0A04FC94B}">
-              <ma14:wrappingTextBoxFlag xmlns="" xmlns:m="http://schemas.openxmlformats.org/officeDocument/2006/math" xmlns:a14="http://schemas.microsoft.com/office/drawing/2010/main" xmlns:ma14="http://schemas.microsoft.com/office/mac/drawingml/2011/main" val="1"/>
+              <ma14:wrappingTextBoxFlag xmlns:ma14="http://schemas.microsoft.com/office/mac/drawingml/2011/main" xmlns:a14="http://schemas.microsoft.com/office/drawing/2010/main" xmlns:m="http://schemas.openxmlformats.org/officeDocument/2006/math" xmlns="" val="1"/>
             </a:ext>
           </a:extLst>
         </p:spPr>
@@ -5081,9 +5556,24 @@
             </a:lvl1pPr>
           </a:lstStyle>
           <a:p>
-            <a:r>
-              <a:t>Numbers are “year”</a:t>
-            </a:r>
+            <a:pPr algn="l"/>
+            <a:r>
+              <a:rPr lang="en-US" sz="1300" dirty="0">
+                <a:solidFill>
+                  <a:srgbClr val="548235"/>
+                </a:solidFill>
+                <a:latin typeface="Arial" panose="020B0604020202020204" pitchFamily="34" charset="0"/>
+                <a:cs typeface="Arial" panose="020B0604020202020204" pitchFamily="34" charset="0"/>
+              </a:rPr>
+              <a:t>year: Int</a:t>
+            </a:r>
+            <a:endParaRPr sz="1300" dirty="0">
+              <a:solidFill>
+                <a:srgbClr val="548235"/>
+              </a:solidFill>
+              <a:latin typeface="Arial" panose="020B0604020202020204" pitchFamily="34" charset="0"/>
+              <a:cs typeface="Arial" panose="020B0604020202020204" pitchFamily="34" charset="0"/>
+            </a:endParaRPr>
           </a:p>
         </p:txBody>
       </p:sp>
@@ -5166,7 +5656,7 @@
           </a:ln>
           <a:extLst>
             <a:ext uri="{C572A759-6A51-4108-AA02-DFA0A04FC94B}">
-              <ma14:wrappingTextBoxFlag xmlns="" xmlns:m="http://schemas.openxmlformats.org/officeDocument/2006/math" xmlns:a14="http://schemas.microsoft.com/office/drawing/2010/main" xmlns:ma14="http://schemas.microsoft.com/office/mac/drawingml/2011/main" val="1"/>
+              <ma14:wrappingTextBoxFlag xmlns:ma14="http://schemas.microsoft.com/office/mac/drawingml/2011/main" xmlns:a14="http://schemas.microsoft.com/office/drawing/2010/main" xmlns:m="http://schemas.openxmlformats.org/officeDocument/2006/math" xmlns="" val="1"/>
             </a:ext>
           </a:extLst>
         </p:spPr>
@@ -5205,7 +5695,7 @@
           </a:ln>
           <a:extLst>
             <a:ext uri="{C572A759-6A51-4108-AA02-DFA0A04FC94B}">
-              <ma14:wrappingTextBoxFlag xmlns="" xmlns:m="http://schemas.openxmlformats.org/officeDocument/2006/math" xmlns:a14="http://schemas.microsoft.com/office/drawing/2010/main" xmlns:ma14="http://schemas.microsoft.com/office/mac/drawingml/2011/main" val="1"/>
+              <ma14:wrappingTextBoxFlag xmlns:ma14="http://schemas.microsoft.com/office/mac/drawingml/2011/main" xmlns:a14="http://schemas.microsoft.com/office/drawing/2010/main" xmlns:m="http://schemas.openxmlformats.org/officeDocument/2006/math" xmlns="" val="1"/>
             </a:ext>
           </a:extLst>
         </p:spPr>
@@ -5273,7 +5763,7 @@
           </a:ln>
           <a:extLst>
             <a:ext uri="{C572A759-6A51-4108-AA02-DFA0A04FC94B}">
-              <ma14:wrappingTextBoxFlag xmlns="" xmlns:m="http://schemas.openxmlformats.org/officeDocument/2006/math" xmlns:a14="http://schemas.microsoft.com/office/drawing/2010/main" xmlns:ma14="http://schemas.microsoft.com/office/mac/drawingml/2011/main" val="1"/>
+              <ma14:wrappingTextBoxFlag xmlns:ma14="http://schemas.microsoft.com/office/mac/drawingml/2011/main" xmlns:a14="http://schemas.microsoft.com/office/drawing/2010/main" xmlns:m="http://schemas.openxmlformats.org/officeDocument/2006/math" xmlns="" val="1"/>
             </a:ext>
           </a:extLst>
         </p:spPr>
@@ -5400,7 +5890,7 @@
           </a:ln>
           <a:extLst>
             <a:ext uri="{C572A759-6A51-4108-AA02-DFA0A04FC94B}">
-              <ma14:wrappingTextBoxFlag xmlns="" xmlns:m="http://schemas.openxmlformats.org/officeDocument/2006/math" xmlns:a14="http://schemas.microsoft.com/office/drawing/2010/main" xmlns:ma14="http://schemas.microsoft.com/office/mac/drawingml/2011/main" val="1"/>
+              <ma14:wrappingTextBoxFlag xmlns:ma14="http://schemas.microsoft.com/office/mac/drawingml/2011/main" xmlns:a14="http://schemas.microsoft.com/office/drawing/2010/main" xmlns:m="http://schemas.openxmlformats.org/officeDocument/2006/math" xmlns="" val="1"/>
             </a:ext>
           </a:extLst>
         </p:spPr>
@@ -5439,7 +5929,7 @@
           </a:ln>
           <a:extLst>
             <a:ext uri="{C572A759-6A51-4108-AA02-DFA0A04FC94B}">
-              <ma14:wrappingTextBoxFlag xmlns="" xmlns:m="http://schemas.openxmlformats.org/officeDocument/2006/math" xmlns:a14="http://schemas.microsoft.com/office/drawing/2010/main" xmlns:ma14="http://schemas.microsoft.com/office/mac/drawingml/2011/main" val="1"/>
+              <ma14:wrappingTextBoxFlag xmlns:ma14="http://schemas.microsoft.com/office/mac/drawingml/2011/main" xmlns:a14="http://schemas.microsoft.com/office/drawing/2010/main" xmlns:m="http://schemas.openxmlformats.org/officeDocument/2006/math" xmlns="" val="1"/>
             </a:ext>
           </a:extLst>
         </p:spPr>
@@ -5478,7 +5968,7 @@
           </a:ln>
           <a:extLst>
             <a:ext uri="{C572A759-6A51-4108-AA02-DFA0A04FC94B}">
-              <ma14:wrappingTextBoxFlag xmlns="" xmlns:m="http://schemas.openxmlformats.org/officeDocument/2006/math" xmlns:a14="http://schemas.microsoft.com/office/drawing/2010/main" xmlns:ma14="http://schemas.microsoft.com/office/mac/drawingml/2011/main" val="1"/>
+              <ma14:wrappingTextBoxFlag xmlns:ma14="http://schemas.microsoft.com/office/mac/drawingml/2011/main" xmlns:a14="http://schemas.microsoft.com/office/drawing/2010/main" xmlns:m="http://schemas.openxmlformats.org/officeDocument/2006/math" xmlns="" val="1"/>
             </a:ext>
           </a:extLst>
         </p:spPr>
@@ -5507,8 +5997,8 @@
         </p:nvSpPr>
         <p:spPr>
           <a:xfrm>
-            <a:off x="9691681" y="3832137"/>
-            <a:ext cx="2100264" cy="345439"/>
+            <a:off x="9972705" y="3789669"/>
+            <a:ext cx="2100264" cy="292384"/>
           </a:xfrm>
           <a:prstGeom prst="rect">
             <a:avLst/>
@@ -5518,7 +6008,7 @@
           </a:ln>
           <a:extLst>
             <a:ext uri="{C572A759-6A51-4108-AA02-DFA0A04FC94B}">
-              <ma14:wrappingTextBoxFlag xmlns="" xmlns:m="http://schemas.openxmlformats.org/officeDocument/2006/math" xmlns:a14="http://schemas.microsoft.com/office/drawing/2010/main" xmlns:ma14="http://schemas.microsoft.com/office/mac/drawingml/2011/main" val="1"/>
+              <ma14:wrappingTextBoxFlag xmlns:ma14="http://schemas.microsoft.com/office/mac/drawingml/2011/main" xmlns:a14="http://schemas.microsoft.com/office/drawing/2010/main" xmlns:m="http://schemas.openxmlformats.org/officeDocument/2006/math" xmlns="" val="1"/>
             </a:ext>
           </a:extLst>
         </p:spPr>
@@ -5532,9 +6022,24 @@
             </a:lvl1pPr>
           </a:lstStyle>
           <a:p>
-            <a:r>
-              <a:t>Numbers are “year”</a:t>
-            </a:r>
+            <a:pPr algn="l"/>
+            <a:r>
+              <a:rPr lang="en-US" sz="1300" dirty="0">
+                <a:solidFill>
+                  <a:srgbClr val="548235"/>
+                </a:solidFill>
+                <a:latin typeface="Arial" panose="020B0604020202020204" pitchFamily="34" charset="0"/>
+                <a:cs typeface="Arial" panose="020B0604020202020204" pitchFamily="34" charset="0"/>
+              </a:rPr>
+              <a:t>year: Int</a:t>
+            </a:r>
+            <a:endParaRPr sz="1300" dirty="0">
+              <a:solidFill>
+                <a:srgbClr val="548235"/>
+              </a:solidFill>
+              <a:latin typeface="Arial" panose="020B0604020202020204" pitchFamily="34" charset="0"/>
+              <a:cs typeface="Arial" panose="020B0604020202020204" pitchFamily="34" charset="0"/>
+            </a:endParaRPr>
           </a:p>
         </p:txBody>
       </p:sp>
@@ -5546,8 +6051,8 @@
         </p:nvSpPr>
         <p:spPr>
           <a:xfrm>
-            <a:off x="-34111" y="1646769"/>
-            <a:ext cx="868182" cy="646327"/>
+            <a:off x="73827" y="1597232"/>
+            <a:ext cx="2395845" cy="646327"/>
           </a:xfrm>
           <a:prstGeom prst="rect">
             <a:avLst/>
@@ -5557,7 +6062,7 @@
           </a:ln>
           <a:extLst>
             <a:ext uri="{C572A759-6A51-4108-AA02-DFA0A04FC94B}">
-              <ma14:wrappingTextBoxFlag xmlns="" xmlns:m="http://schemas.openxmlformats.org/officeDocument/2006/math" xmlns:a14="http://schemas.microsoft.com/office/drawing/2010/main" xmlns:ma14="http://schemas.microsoft.com/office/mac/drawingml/2011/main" val="1"/>
+              <ma14:wrappingTextBoxFlag xmlns:ma14="http://schemas.microsoft.com/office/mac/drawingml/2011/main" xmlns:a14="http://schemas.microsoft.com/office/drawing/2010/main" xmlns:m="http://schemas.openxmlformats.org/officeDocument/2006/math" xmlns="" val="1"/>
             </a:ext>
           </a:extLst>
         </p:spPr>
@@ -5578,20 +6083,84 @@
               </a:defRPr>
             </a:pPr>
             <a:r>
-              <a:rPr lang="en-US" dirty="0"/>
+              <a:rPr lang="en-US" altLang="zh-CN" sz="1200" b="0" i="0" dirty="0" err="1">
+                <a:solidFill>
+                  <a:srgbClr val="338DCD"/>
+                </a:solidFill>
+                <a:effectLst/>
+                <a:latin typeface="Arial" panose="020B0604020202020204" pitchFamily="34" charset="0"/>
+                <a:cs typeface="Arial" panose="020B0604020202020204" pitchFamily="34" charset="0"/>
+              </a:rPr>
+              <a:t>unstrNumericProp:DOUBLE</a:t>
+            </a:r>
+            <a:r>
+              <a:rPr lang="en-US" altLang="zh-CN" sz="1200" b="0" i="0" dirty="0">
+                <a:solidFill>
+                  <a:srgbClr val="338DCD"/>
+                </a:solidFill>
+                <a:effectLst/>
+                <a:latin typeface="Arial" panose="020B0604020202020204" pitchFamily="34" charset="0"/>
+                <a:cs typeface="Arial" panose="020B0604020202020204" pitchFamily="34" charset="0"/>
+              </a:rPr>
+              <a:t>:-12.5</a:t>
+            </a:r>
+            <a:endParaRPr lang="en-US" sz="1200" dirty="0">
+              <a:solidFill>
+                <a:srgbClr val="338DCD"/>
+              </a:solidFill>
+              <a:latin typeface="Arial" panose="020B0604020202020204" pitchFamily="34" charset="0"/>
+              <a:cs typeface="Arial" panose="020B0604020202020204" pitchFamily="34" charset="0"/>
+            </a:endParaRPr>
+          </a:p>
+          <a:p>
+            <a:pPr>
+              <a:defRPr>
+                <a:solidFill>
+                  <a:schemeClr val="accent2">
+                    <a:satOff val="-18194"/>
+                    <a:lumOff val="-11215"/>
+                  </a:schemeClr>
+                </a:solidFill>
+              </a:defRPr>
+            </a:pPr>
+            <a:r>
+              <a:rPr lang="en-US" sz="1200" dirty="0">
+                <a:latin typeface="Arial" panose="020B0604020202020204" pitchFamily="34" charset="0"/>
+                <a:cs typeface="Arial" panose="020B0604020202020204" pitchFamily="34" charset="0"/>
+              </a:rPr>
               <a:t>325, </a:t>
             </a:r>
             <a:r>
-              <a:rPr dirty="0"/>
+              <a:rPr sz="1200" dirty="0">
+                <a:latin typeface="Arial" panose="020B0604020202020204" pitchFamily="34" charset="0"/>
+                <a:cs typeface="Arial" panose="020B0604020202020204" pitchFamily="34" charset="0"/>
+              </a:rPr>
               <a:t>3.7</a:t>
             </a:r>
-          </a:p>
-          <a:p>
-            <a:r>
-              <a:rPr dirty="0" err="1"/>
+            <a:r>
+              <a:rPr lang="en-US" sz="1200" dirty="0">
+                <a:latin typeface="Arial" panose="020B0604020202020204" pitchFamily="34" charset="0"/>
+                <a:cs typeface="Arial" panose="020B0604020202020204" pitchFamily="34" charset="0"/>
+              </a:rPr>
+              <a:t>, -2</a:t>
+            </a:r>
+            <a:endParaRPr sz="1200" dirty="0">
+              <a:latin typeface="Arial" panose="020B0604020202020204" pitchFamily="34" charset="0"/>
+              <a:cs typeface="Arial" panose="020B0604020202020204" pitchFamily="34" charset="0"/>
+            </a:endParaRPr>
+          </a:p>
+          <a:p>
+            <a:r>
+              <a:rPr sz="1200" dirty="0" err="1">
+                <a:latin typeface="Arial" panose="020B0604020202020204" pitchFamily="34" charset="0"/>
+                <a:cs typeface="Arial" panose="020B0604020202020204" pitchFamily="34" charset="0"/>
+              </a:rPr>
               <a:t>ABFsUni</a:t>
             </a:r>
-            <a:endParaRPr dirty="0"/>
+            <a:endParaRPr sz="1200" dirty="0">
+              <a:latin typeface="Arial" panose="020B0604020202020204" pitchFamily="34" charset="0"/>
+              <a:cs typeface="Arial" panose="020B0604020202020204" pitchFamily="34" charset="0"/>
+            </a:endParaRPr>
           </a:p>
         </p:txBody>
       </p:sp>
@@ -5603,8 +6172,8 @@
         </p:nvSpPr>
         <p:spPr>
           <a:xfrm>
-            <a:off x="6414600" y="1344306"/>
-            <a:ext cx="845740" cy="646327"/>
+            <a:off x="6401348" y="1344306"/>
+            <a:ext cx="1039704" cy="461661"/>
           </a:xfrm>
           <a:prstGeom prst="rect">
             <a:avLst/>
@@ -5614,7 +6183,7 @@
           </a:ln>
           <a:extLst>
             <a:ext uri="{C572A759-6A51-4108-AA02-DFA0A04FC94B}">
-              <ma14:wrappingTextBoxFlag xmlns="" xmlns:m="http://schemas.openxmlformats.org/officeDocument/2006/math" xmlns:a14="http://schemas.microsoft.com/office/drawing/2010/main" xmlns:ma14="http://schemas.microsoft.com/office/mac/drawingml/2011/main" val="1"/>
+              <ma14:wrappingTextBoxFlag xmlns:ma14="http://schemas.microsoft.com/office/mac/drawingml/2011/main" xmlns:a14="http://schemas.microsoft.com/office/drawing/2010/main" xmlns:m="http://schemas.openxmlformats.org/officeDocument/2006/math" xmlns="" val="1"/>
             </a:ext>
           </a:extLst>
         </p:spPr>
@@ -5635,20 +6204,43 @@
               </a:defRPr>
             </a:pPr>
             <a:r>
-              <a:rPr lang="en-US" dirty="0"/>
+              <a:rPr lang="en-US" sz="1200" dirty="0">
+                <a:latin typeface="Arial" panose="020B0604020202020204" pitchFamily="34" charset="0"/>
+                <a:cs typeface="Arial" panose="020B0604020202020204" pitchFamily="34" charset="0"/>
+              </a:rPr>
               <a:t>934, </a:t>
             </a:r>
             <a:r>
-              <a:rPr dirty="0"/>
+              <a:rPr sz="1200" dirty="0">
+                <a:latin typeface="Arial" panose="020B0604020202020204" pitchFamily="34" charset="0"/>
+                <a:cs typeface="Arial" panose="020B0604020202020204" pitchFamily="34" charset="0"/>
+              </a:rPr>
               <a:t>4.1</a:t>
             </a:r>
-          </a:p>
-          <a:p>
-            <a:r>
-              <a:rPr dirty="0" err="1"/>
+            <a:r>
+              <a:rPr lang="en-US" sz="1200" dirty="0">
+                <a:latin typeface="Arial" panose="020B0604020202020204" pitchFamily="34" charset="0"/>
+                <a:cs typeface="Arial" panose="020B0604020202020204" pitchFamily="34" charset="0"/>
+              </a:rPr>
+              <a:t>, -100</a:t>
+            </a:r>
+            <a:endParaRPr sz="1200" dirty="0">
+              <a:latin typeface="Arial" panose="020B0604020202020204" pitchFamily="34" charset="0"/>
+              <a:cs typeface="Arial" panose="020B0604020202020204" pitchFamily="34" charset="0"/>
+            </a:endParaRPr>
+          </a:p>
+          <a:p>
+            <a:r>
+              <a:rPr sz="1200" dirty="0" err="1">
+                <a:latin typeface="Arial" panose="020B0604020202020204" pitchFamily="34" charset="0"/>
+                <a:cs typeface="Arial" panose="020B0604020202020204" pitchFamily="34" charset="0"/>
+              </a:rPr>
               <a:t>CsWork</a:t>
             </a:r>
-            <a:endParaRPr dirty="0"/>
+            <a:endParaRPr sz="1200" dirty="0">
+              <a:latin typeface="Arial" panose="020B0604020202020204" pitchFamily="34" charset="0"/>
+              <a:cs typeface="Arial" panose="020B0604020202020204" pitchFamily="34" charset="0"/>
+            </a:endParaRPr>
           </a:p>
         </p:txBody>
       </p:sp>
@@ -5660,8 +6252,8 @@
         </p:nvSpPr>
         <p:spPr>
           <a:xfrm>
-            <a:off x="6694202" y="3507402"/>
-            <a:ext cx="948332" cy="646327"/>
+            <a:off x="5971096" y="4062558"/>
+            <a:ext cx="2310885" cy="646327"/>
           </a:xfrm>
           <a:prstGeom prst="rect">
             <a:avLst/>
@@ -5671,7 +6263,7 @@
           </a:ln>
           <a:extLst>
             <a:ext uri="{C572A759-6A51-4108-AA02-DFA0A04FC94B}">
-              <ma14:wrappingTextBoxFlag xmlns="" xmlns:m="http://schemas.openxmlformats.org/officeDocument/2006/math" xmlns:a14="http://schemas.microsoft.com/office/drawing/2010/main" xmlns:ma14="http://schemas.microsoft.com/office/mac/drawingml/2011/main" val="1"/>
+              <ma14:wrappingTextBoxFlag xmlns:ma14="http://schemas.microsoft.com/office/mac/drawingml/2011/main" xmlns:a14="http://schemas.microsoft.com/office/drawing/2010/main" xmlns:m="http://schemas.openxmlformats.org/officeDocument/2006/math" xmlns="" val="1"/>
             </a:ext>
           </a:extLst>
         </p:spPr>
@@ -5692,20 +6284,84 @@
               </a:defRPr>
             </a:pPr>
             <a:r>
-              <a:rPr lang="en-US" dirty="0"/>
+              <a:rPr lang="en-US" altLang="zh-CN" sz="1200" b="0" i="0" dirty="0" err="1">
+                <a:solidFill>
+                  <a:srgbClr val="338DCD"/>
+                </a:solidFill>
+                <a:effectLst/>
+                <a:latin typeface="Arial" panose="020B0604020202020204" pitchFamily="34" charset="0"/>
+                <a:cs typeface="Arial" panose="020B0604020202020204" pitchFamily="34" charset="0"/>
+              </a:rPr>
+              <a:t>unstrNumericProp:DOUBLE</a:t>
+            </a:r>
+            <a:r>
+              <a:rPr lang="en-US" altLang="zh-CN" sz="1200" b="0" i="0" dirty="0">
+                <a:solidFill>
+                  <a:srgbClr val="338DCD"/>
+                </a:solidFill>
+                <a:effectLst/>
+                <a:latin typeface="Arial" panose="020B0604020202020204" pitchFamily="34" charset="0"/>
+                <a:cs typeface="Arial" panose="020B0604020202020204" pitchFamily="34" charset="0"/>
+              </a:rPr>
+              <a:t>:-3.1</a:t>
+            </a:r>
+            <a:endParaRPr lang="en-US" sz="1200" dirty="0">
+              <a:solidFill>
+                <a:srgbClr val="338DCD"/>
+              </a:solidFill>
+              <a:latin typeface="Arial" panose="020B0604020202020204" pitchFamily="34" charset="0"/>
+              <a:cs typeface="Arial" panose="020B0604020202020204" pitchFamily="34" charset="0"/>
+            </a:endParaRPr>
+          </a:p>
+          <a:p>
+            <a:pPr>
+              <a:defRPr>
+                <a:solidFill>
+                  <a:schemeClr val="accent2">
+                    <a:satOff val="-18194"/>
+                    <a:lumOff val="-11215"/>
+                  </a:schemeClr>
+                </a:solidFill>
+              </a:defRPr>
+            </a:pPr>
+            <a:r>
+              <a:rPr lang="en-US" sz="1200" dirty="0">
+                <a:latin typeface="Arial" panose="020B0604020202020204" pitchFamily="34" charset="0"/>
+                <a:cs typeface="Arial" panose="020B0604020202020204" pitchFamily="34" charset="0"/>
+              </a:rPr>
               <a:t>824, </a:t>
             </a:r>
             <a:r>
-              <a:rPr dirty="0"/>
+              <a:rPr sz="1200" dirty="0">
+                <a:latin typeface="Arial" panose="020B0604020202020204" pitchFamily="34" charset="0"/>
+                <a:cs typeface="Arial" panose="020B0604020202020204" pitchFamily="34" charset="0"/>
+              </a:rPr>
               <a:t>4.1</a:t>
             </a:r>
-          </a:p>
-          <a:p>
-            <a:r>
-              <a:rPr dirty="0" err="1"/>
+            <a:r>
+              <a:rPr lang="en-US" sz="1200" dirty="0">
+                <a:latin typeface="Arial" panose="020B0604020202020204" pitchFamily="34" charset="0"/>
+                <a:cs typeface="Arial" panose="020B0604020202020204" pitchFamily="34" charset="0"/>
+              </a:rPr>
+              <a:t>, 7</a:t>
+            </a:r>
+            <a:endParaRPr sz="1200" dirty="0">
+              <a:latin typeface="Arial" panose="020B0604020202020204" pitchFamily="34" charset="0"/>
+              <a:cs typeface="Arial" panose="020B0604020202020204" pitchFamily="34" charset="0"/>
+            </a:endParaRPr>
+          </a:p>
+          <a:p>
+            <a:r>
+              <a:rPr sz="1200" dirty="0" err="1">
+                <a:latin typeface="Arial" panose="020B0604020202020204" pitchFamily="34" charset="0"/>
+                <a:cs typeface="Arial" panose="020B0604020202020204" pitchFamily="34" charset="0"/>
+              </a:rPr>
               <a:t>DEsWork</a:t>
             </a:r>
-            <a:endParaRPr dirty="0"/>
+            <a:endParaRPr sz="1200" dirty="0">
+              <a:latin typeface="Arial" panose="020B0604020202020204" pitchFamily="34" charset="0"/>
+              <a:cs typeface="Arial" panose="020B0604020202020204" pitchFamily="34" charset="0"/>
+            </a:endParaRPr>
           </a:p>
         </p:txBody>
       </p:sp>
@@ -5717,8 +6373,8 @@
         </p:nvSpPr>
         <p:spPr>
           <a:xfrm>
-            <a:off x="1412901" y="60181"/>
-            <a:ext cx="2397468" cy="646327"/>
+            <a:off x="435012" y="58779"/>
+            <a:ext cx="2570806" cy="830993"/>
           </a:xfrm>
           <a:prstGeom prst="rect">
             <a:avLst/>
@@ -5728,7 +6384,7 @@
           </a:ln>
           <a:extLst>
             <a:ext uri="{C572A759-6A51-4108-AA02-DFA0A04FC94B}">
-              <ma14:wrappingTextBoxFlag xmlns="" xmlns:m="http://schemas.openxmlformats.org/officeDocument/2006/math" xmlns:a14="http://schemas.microsoft.com/office/drawing/2010/main" xmlns:ma14="http://schemas.microsoft.com/office/mac/drawingml/2011/main" val="1"/>
+              <ma14:wrappingTextBoxFlag xmlns:ma14="http://schemas.microsoft.com/office/mac/drawingml/2011/main" xmlns:a14="http://schemas.microsoft.com/office/drawing/2010/main" xmlns:m="http://schemas.openxmlformats.org/officeDocument/2006/math" xmlns="" val="1"/>
             </a:ext>
           </a:extLst>
         </p:spPr>
@@ -5752,6 +6408,8 @@
                 <a:solidFill>
                   <a:srgbClr val="0070C0"/>
                 </a:solidFill>
+                <a:latin typeface="Arial" panose="020B0604020202020204" pitchFamily="34" charset="0"/>
+                <a:cs typeface="Arial" panose="020B0604020202020204" pitchFamily="34" charset="0"/>
               </a:rPr>
               <a:t>unstrDateProp1:DATE:1900-01-01</a:t>
             </a:r>
@@ -5771,6 +6429,8 @@
                 <a:solidFill>
                   <a:srgbClr val="0070C0"/>
                 </a:solidFill>
+                <a:latin typeface="Arial" panose="020B0604020202020204" pitchFamily="34" charset="0"/>
+                <a:cs typeface="Arial" panose="020B0604020202020204" pitchFamily="34" charset="0"/>
               </a:rPr>
               <a:t>unstrDateProp2:DATE:1920-01-01</a:t>
             </a:r>
@@ -5779,29 +6439,51 @@
             <a:r>
               <a:rPr sz="1200" dirty="0">
                 <a:solidFill>
-                  <a:schemeClr val="accent6">
-                    <a:lumMod val="75000"/>
-                  </a:schemeClr>
-                </a:solidFill>
+                  <a:srgbClr val="548235"/>
+                </a:solidFill>
+                <a:latin typeface="Arial" panose="020B0604020202020204" pitchFamily="34" charset="0"/>
+                <a:cs typeface="Arial" panose="020B0604020202020204" pitchFamily="34" charset="0"/>
               </a:rPr>
               <a:t>Alice</a:t>
             </a:r>
             <a:r>
               <a:rPr lang="en-US" sz="1200" dirty="0">
                 <a:solidFill>
-                  <a:schemeClr val="accent6">
-                    <a:lumMod val="75000"/>
-                  </a:schemeClr>
-                </a:solidFill>
-              </a:rPr>
-              <a:t>, 1, true, false, 35, 5.0, 1900-1-1</a:t>
+                  <a:srgbClr val="548235"/>
+                </a:solidFill>
+                <a:latin typeface="Arial" panose="020B0604020202020204" pitchFamily="34" charset="0"/>
+                <a:cs typeface="Arial" panose="020B0604020202020204" pitchFamily="34" charset="0"/>
+              </a:rPr>
+              <a:t>, 1, true, false, 35, 5.0, 1900-1-1,</a:t>
+            </a:r>
+            <a:r>
+              <a:rPr lang="zh-CN" altLang="en-US" sz="1200" b="0" i="0" dirty="0">
+                <a:solidFill>
+                  <a:srgbClr val="548235"/>
+                </a:solidFill>
+                <a:effectLst/>
+                <a:latin typeface="Arial" panose="020B0604020202020204" pitchFamily="34" charset="0"/>
+                <a:cs typeface="Arial" panose="020B0604020202020204" pitchFamily="34" charset="0"/>
+              </a:rPr>
+              <a:t> </a:t>
+            </a:r>
+            <a:r>
+              <a:rPr lang="en-US" altLang="zh-CN" sz="1200" b="0" i="0" dirty="0">
+                <a:solidFill>
+                  <a:srgbClr val="548235"/>
+                </a:solidFill>
+                <a:effectLst/>
+                <a:latin typeface="Arial" panose="020B0604020202020204" pitchFamily="34" charset="0"/>
+                <a:cs typeface="Arial" panose="020B0604020202020204" pitchFamily="34" charset="0"/>
+              </a:rPr>
+              <a:t>2011-08-20 11:25:30</a:t>
             </a:r>
             <a:endParaRPr sz="1200" dirty="0">
               <a:solidFill>
-                <a:schemeClr val="accent6">
-                  <a:lumMod val="75000"/>
-                </a:schemeClr>
+                <a:srgbClr val="548235"/>
               </a:solidFill>
+              <a:latin typeface="Arial" panose="020B0604020202020204" pitchFamily="34" charset="0"/>
+              <a:cs typeface="Arial" panose="020B0604020202020204" pitchFamily="34" charset="0"/>
             </a:endParaRPr>
           </a:p>
         </p:txBody>
@@ -5814,8 +6496,8 @@
         </p:nvSpPr>
         <p:spPr>
           <a:xfrm>
-            <a:off x="2072525" y="3322604"/>
-            <a:ext cx="2487662" cy="1015659"/>
+            <a:off x="1437902" y="3617525"/>
+            <a:ext cx="2687176" cy="1200325"/>
           </a:xfrm>
           <a:prstGeom prst="rect">
             <a:avLst/>
@@ -5825,7 +6507,7 @@
           </a:ln>
           <a:extLst>
             <a:ext uri="{C572A759-6A51-4108-AA02-DFA0A04FC94B}">
-              <ma14:wrappingTextBoxFlag xmlns="" xmlns:m="http://schemas.openxmlformats.org/officeDocument/2006/math" xmlns:a14="http://schemas.microsoft.com/office/drawing/2010/main" xmlns:ma14="http://schemas.microsoft.com/office/mac/drawingml/2011/main" val="1"/>
+              <ma14:wrappingTextBoxFlag xmlns:ma14="http://schemas.microsoft.com/office/mac/drawingml/2011/main" xmlns:a14="http://schemas.microsoft.com/office/drawing/2010/main" xmlns:m="http://schemas.openxmlformats.org/officeDocument/2006/math" xmlns="" val="1"/>
             </a:ext>
           </a:extLst>
         </p:spPr>
@@ -5842,6 +6524,8 @@
                     <a:lumMod val="75000"/>
                   </a:schemeClr>
                 </a:solidFill>
+                <a:latin typeface="Arial" panose="020B0604020202020204" pitchFamily="34" charset="0"/>
+                <a:cs typeface="Arial" panose="020B0604020202020204" pitchFamily="34" charset="0"/>
               </a:rPr>
               <a:t>Bob</a:t>
             </a:r>
@@ -5852,6 +6536,8 @@
                     <a:lumMod val="75000"/>
                   </a:schemeClr>
                 </a:solidFill>
+                <a:latin typeface="Arial" panose="020B0604020202020204" pitchFamily="34" charset="0"/>
+                <a:cs typeface="Arial" panose="020B0604020202020204" pitchFamily="34" charset="0"/>
               </a:rPr>
               <a:t>, 2, true, false, </a:t>
             </a:r>
@@ -5862,6 +6548,8 @@
                     <a:lumMod val="75000"/>
                   </a:schemeClr>
                 </a:solidFill>
+                <a:latin typeface="Arial" panose="020B0604020202020204" pitchFamily="34" charset="0"/>
+                <a:cs typeface="Arial" panose="020B0604020202020204" pitchFamily="34" charset="0"/>
               </a:rPr>
               <a:t>30</a:t>
             </a:r>
@@ -5872,15 +6560,39 @@
                     <a:lumMod val="75000"/>
                   </a:schemeClr>
                 </a:solidFill>
+                <a:latin typeface="Arial" panose="020B0604020202020204" pitchFamily="34" charset="0"/>
+                <a:cs typeface="Arial" panose="020B0604020202020204" pitchFamily="34" charset="0"/>
               </a:rPr>
               <a:t>, 5.1, 1900-1-1,</a:t>
+            </a:r>
+            <a:r>
+              <a:rPr lang="zh-CN" altLang="en-US" sz="1200" b="0" i="0" dirty="0">
+                <a:solidFill>
+                  <a:srgbClr val="24292F"/>
+                </a:solidFill>
+                <a:effectLst/>
+                <a:latin typeface="Arial" panose="020B0604020202020204" pitchFamily="34" charset="0"/>
+                <a:cs typeface="Arial" panose="020B0604020202020204" pitchFamily="34" charset="0"/>
+              </a:rPr>
+              <a:t> </a:t>
+            </a:r>
+            <a:r>
+              <a:rPr lang="en-US" altLang="zh-CN" sz="1200" b="0" i="0" dirty="0">
+                <a:solidFill>
+                  <a:srgbClr val="548235"/>
+                </a:solidFill>
+                <a:effectLst/>
+                <a:latin typeface="Arial" panose="020B0604020202020204" pitchFamily="34" charset="0"/>
+                <a:cs typeface="Arial" panose="020B0604020202020204" pitchFamily="34" charset="0"/>
+              </a:rPr>
+              <a:t>2008-11-03 13:25:30.000526</a:t>
             </a:r>
             <a:endParaRPr sz="1200" dirty="0">
               <a:solidFill>
-                <a:schemeClr val="accent6">
-                  <a:lumMod val="75000"/>
-                </a:schemeClr>
+                <a:srgbClr val="548235"/>
               </a:solidFill>
+              <a:latin typeface="Arial" panose="020B0604020202020204" pitchFamily="34" charset="0"/>
+              <a:cs typeface="Arial" panose="020B0604020202020204" pitchFamily="34" charset="0"/>
             </a:endParaRPr>
           </a:p>
           <a:p>
@@ -5895,8 +6607,11 @@
               </a:defRPr>
             </a:pPr>
             <a:r>
-              <a:rPr lang="en-US" sz="1200" dirty="0"/>
-              <a:t>unstrNumericProp:Int32:47,</a:t>
+              <a:rPr lang="en-US" sz="1200" dirty="0">
+                <a:latin typeface="Arial" panose="020B0604020202020204" pitchFamily="34" charset="0"/>
+                <a:cs typeface="Arial" panose="020B0604020202020204" pitchFamily="34" charset="0"/>
+              </a:rPr>
+              <a:t>unstrNumericProp:Int64:47,</a:t>
             </a:r>
           </a:p>
           <a:p>
@@ -5911,8 +6626,11 @@
               </a:defRPr>
             </a:pPr>
             <a:r>
-              <a:rPr lang="en-US" sz="1200" dirty="0"/>
-              <a:t>unstrNumericProp2:Int32:20</a:t>
+              <a:rPr lang="en-US" sz="1200" dirty="0">
+                <a:latin typeface="Arial" panose="020B0604020202020204" pitchFamily="34" charset="0"/>
+                <a:cs typeface="Arial" panose="020B0604020202020204" pitchFamily="34" charset="0"/>
+              </a:rPr>
+              <a:t>unstrNumericProp2:Int64:20</a:t>
             </a:r>
           </a:p>
           <a:p>
@@ -5927,7 +6645,10 @@
               </a:defRPr>
             </a:pPr>
             <a:r>
-              <a:rPr lang="en-US" sz="1200" dirty="0"/>
+              <a:rPr lang="en-US" sz="1200" dirty="0">
+                <a:latin typeface="Arial" panose="020B0604020202020204" pitchFamily="34" charset="0"/>
+                <a:cs typeface="Arial" panose="020B0604020202020204" pitchFamily="34" charset="0"/>
+              </a:rPr>
               <a:t>unstrDateProp1:DATE:1950-01-01</a:t>
             </a:r>
           </a:p>
@@ -5943,10 +6664,16 @@
               </a:defRPr>
             </a:pPr>
             <a:r>
-              <a:rPr lang="en-US" sz="1200" dirty="0"/>
+              <a:rPr lang="en-US" sz="1200" dirty="0">
+                <a:latin typeface="Arial" panose="020B0604020202020204" pitchFamily="34" charset="0"/>
+                <a:cs typeface="Arial" panose="020B0604020202020204" pitchFamily="34" charset="0"/>
+              </a:rPr>
               <a:t>unstrDateProp2:DATE:1970-01-01</a:t>
             </a:r>
-            <a:endParaRPr sz="1200" dirty="0"/>
+            <a:endParaRPr sz="1200" dirty="0">
+              <a:latin typeface="Arial" panose="020B0604020202020204" pitchFamily="34" charset="0"/>
+              <a:cs typeface="Arial" panose="020B0604020202020204" pitchFamily="34" charset="0"/>
+            </a:endParaRPr>
           </a:p>
         </p:txBody>
       </p:sp>
@@ -5958,8 +6685,8 @@
         </p:nvSpPr>
         <p:spPr>
           <a:xfrm>
-            <a:off x="4999398" y="29907"/>
-            <a:ext cx="2831588" cy="830993"/>
+            <a:off x="5204442" y="-24101"/>
+            <a:ext cx="3459711" cy="1015659"/>
           </a:xfrm>
           <a:prstGeom prst="rect">
             <a:avLst/>
@@ -5969,7 +6696,7 @@
           </a:ln>
           <a:extLst>
             <a:ext uri="{C572A759-6A51-4108-AA02-DFA0A04FC94B}">
-              <ma14:wrappingTextBoxFlag xmlns="" xmlns:m="http://schemas.openxmlformats.org/officeDocument/2006/math" xmlns:a14="http://schemas.microsoft.com/office/drawing/2010/main" xmlns:ma14="http://schemas.microsoft.com/office/mac/drawingml/2011/main" val="1"/>
+              <ma14:wrappingTextBoxFlag xmlns:ma14="http://schemas.microsoft.com/office/mac/drawingml/2011/main" xmlns:a14="http://schemas.microsoft.com/office/drawing/2010/main" xmlns:m="http://schemas.openxmlformats.org/officeDocument/2006/math" xmlns="" val="1"/>
             </a:ext>
           </a:extLst>
         </p:spPr>
@@ -5993,6 +6720,8 @@
                 <a:solidFill>
                   <a:srgbClr val="0070C0"/>
                 </a:solidFill>
+                <a:latin typeface="Arial" panose="020B0604020202020204" pitchFamily="34" charset="0"/>
+                <a:cs typeface="Arial" panose="020B0604020202020204" pitchFamily="34" charset="0"/>
               </a:rPr>
               <a:t>unstrDateProp1:DATE: 1950-01-01</a:t>
             </a:r>
@@ -6012,6 +6741,8 @@
                 <a:solidFill>
                   <a:srgbClr val="0070C0"/>
                 </a:solidFill>
+                <a:latin typeface="Arial" panose="020B0604020202020204" pitchFamily="34" charset="0"/>
+                <a:cs typeface="Arial" panose="020B0604020202020204" pitchFamily="34" charset="0"/>
               </a:rPr>
               <a:t>unstrDateProp2:DATE: 1950-01-01</a:t>
             </a:r>
@@ -6021,6 +6752,8 @@
                   <a:lumMod val="75000"/>
                 </a:schemeClr>
               </a:solidFill>
+              <a:latin typeface="Arial" panose="020B0604020202020204" pitchFamily="34" charset="0"/>
+              <a:cs typeface="Arial" panose="020B0604020202020204" pitchFamily="34" charset="0"/>
             </a:endParaRPr>
           </a:p>
           <a:p>
@@ -6040,31 +6773,62 @@
                     <a:lumMod val="75000"/>
                   </a:schemeClr>
                 </a:solidFill>
-              </a:rPr>
-              <a:t>unstrNumericProp:Int:52</a:t>
+                <a:latin typeface="Arial" panose="020B0604020202020204" pitchFamily="34" charset="0"/>
+                <a:cs typeface="Arial" panose="020B0604020202020204" pitchFamily="34" charset="0"/>
+              </a:rPr>
+              <a:t>unstrNumericProp:Int64:52</a:t>
             </a:r>
           </a:p>
           <a:p>
             <a:r>
               <a:rPr sz="1200" dirty="0">
                 <a:solidFill>
-                  <a:schemeClr val="accent6">
-                    <a:lumMod val="75000"/>
-                  </a:schemeClr>
-                </a:solidFill>
+                  <a:srgbClr val="548235"/>
+                </a:solidFill>
+                <a:latin typeface="Arial" panose="020B0604020202020204" pitchFamily="34" charset="0"/>
+                <a:cs typeface="Arial" panose="020B0604020202020204" pitchFamily="34" charset="0"/>
               </a:rPr>
               <a:t>Carol</a:t>
             </a:r>
             <a:r>
               <a:rPr lang="en-US" sz="1200" dirty="0">
                 <a:solidFill>
-                  <a:schemeClr val="accent6">
-                    <a:lumMod val="75000"/>
-                  </a:schemeClr>
-                </a:solidFill>
-              </a:rPr>
-              <a:t>,1, false, true, 45, 5.0, 1940-06-22</a:t>
-            </a:r>
+                  <a:srgbClr val="548235"/>
+                </a:solidFill>
+                <a:latin typeface="Arial" panose="020B0604020202020204" pitchFamily="34" charset="0"/>
+                <a:cs typeface="Arial" panose="020B0604020202020204" pitchFamily="34" charset="0"/>
+              </a:rPr>
+              <a:t>,1, false, true, 45, 5.0, 1940-06-22,</a:t>
+            </a:r>
+            <a:r>
+              <a:rPr lang="zh-CN" altLang="en-US" sz="1200" b="0" i="0" dirty="0">
+                <a:solidFill>
+                  <a:srgbClr val="548235"/>
+                </a:solidFill>
+                <a:effectLst/>
+                <a:latin typeface="Arial" panose="020B0604020202020204" pitchFamily="34" charset="0"/>
+                <a:cs typeface="Arial" panose="020B0604020202020204" pitchFamily="34" charset="0"/>
+              </a:rPr>
+              <a:t> </a:t>
+            </a:r>
+            <a:r>
+              <a:rPr lang="en-US" altLang="zh-CN" sz="1200" b="0" i="0" dirty="0">
+                <a:solidFill>
+                  <a:srgbClr val="548235"/>
+                </a:solidFill>
+                <a:effectLst/>
+                <a:latin typeface="Arial" panose="020B0604020202020204" pitchFamily="34" charset="0"/>
+                <a:cs typeface="Arial" panose="020B0604020202020204" pitchFamily="34" charset="0"/>
+              </a:rPr>
+              <a:t>1911-08-20 02:32:21</a:t>
+            </a:r>
+            <a:endParaRPr lang="en-US" sz="1200" dirty="0">
+              <a:solidFill>
+                <a:srgbClr val="548235"/>
+              </a:solidFill>
+              <a:latin typeface="Arial" panose="020B0604020202020204" pitchFamily="34" charset="0"/>
+              <a:cs typeface="Arial" panose="020B0604020202020204" pitchFamily="34" charset="0"/>
+            </a:endParaRPr>
           </a:p>
         </p:txBody>
       </p:sp>
@@ -6076,8 +6840,8 @@
         </p:nvSpPr>
         <p:spPr>
           <a:xfrm>
-            <a:off x="5828074" y="2591732"/>
-            <a:ext cx="1524711" cy="523216"/>
+            <a:off x="6093182" y="2287844"/>
+            <a:ext cx="2312983" cy="1015659"/>
           </a:xfrm>
           <a:prstGeom prst="rect">
             <a:avLst/>
@@ -6087,7 +6851,7 @@
           </a:ln>
           <a:extLst>
             <a:ext uri="{C572A759-6A51-4108-AA02-DFA0A04FC94B}">
-              <ma14:wrappingTextBoxFlag xmlns="" xmlns:m="http://schemas.openxmlformats.org/officeDocument/2006/math" xmlns:a14="http://schemas.microsoft.com/office/drawing/2010/main" xmlns:ma14="http://schemas.microsoft.com/office/mac/drawingml/2011/main" val="1"/>
+              <ma14:wrappingTextBoxFlag xmlns:ma14="http://schemas.microsoft.com/office/mac/drawingml/2011/main" xmlns:a14="http://schemas.microsoft.com/office/drawing/2010/main" xmlns:m="http://schemas.openxmlformats.org/officeDocument/2006/math" xmlns="" val="1"/>
             </a:ext>
           </a:extLst>
         </p:spPr>
@@ -6098,31 +6862,51 @@
           <a:lstStyle/>
           <a:p>
             <a:r>
-              <a:rPr sz="1400" dirty="0">
-                <a:solidFill>
-                  <a:schemeClr val="accent6">
-                    <a:lumMod val="75000"/>
-                  </a:schemeClr>
-                </a:solidFill>
+              <a:rPr lang="en-US" altLang="zh-CN" sz="1200" b="0" i="0" dirty="0">
+                <a:solidFill>
+                  <a:srgbClr val="338DCD"/>
+                </a:solidFill>
+                <a:effectLst/>
+                <a:latin typeface="Arial" panose="020B0604020202020204" pitchFamily="34" charset="0"/>
+                <a:cs typeface="Arial" panose="020B0604020202020204" pitchFamily="34" charset="0"/>
+              </a:rPr>
+              <a:t>unstrTimestampProp1:TIMESTAMP:2031-11-30 12:25:30</a:t>
+            </a:r>
+            <a:endParaRPr lang="en-US" sz="1200" dirty="0">
+              <a:solidFill>
+                <a:srgbClr val="338DCD"/>
+              </a:solidFill>
+              <a:latin typeface="Arial" panose="020B0604020202020204" pitchFamily="34" charset="0"/>
+              <a:cs typeface="Arial" panose="020B0604020202020204" pitchFamily="34" charset="0"/>
+            </a:endParaRPr>
+          </a:p>
+          <a:p>
+            <a:r>
+              <a:rPr sz="1200" dirty="0">
+                <a:solidFill>
+                  <a:srgbClr val="548235"/>
+                </a:solidFill>
+                <a:latin typeface="Arial" panose="020B0604020202020204" pitchFamily="34" charset="0"/>
+                <a:cs typeface="Arial" panose="020B0604020202020204" pitchFamily="34" charset="0"/>
               </a:rPr>
               <a:t>Dan</a:t>
             </a:r>
             <a:r>
-              <a:rPr lang="en-US" sz="1400" dirty="0">
-                <a:solidFill>
-                  <a:schemeClr val="accent6">
-                    <a:lumMod val="75000"/>
-                  </a:schemeClr>
-                </a:solidFill>
+              <a:rPr lang="en-US" sz="1200" dirty="0">
+                <a:solidFill>
+                  <a:srgbClr val="548235"/>
+                </a:solidFill>
+                <a:latin typeface="Arial" panose="020B0604020202020204" pitchFamily="34" charset="0"/>
+                <a:cs typeface="Arial" panose="020B0604020202020204" pitchFamily="34" charset="0"/>
               </a:rPr>
               <a:t>, 2, false, true</a:t>
             </a:r>
-            <a:endParaRPr sz="1400" dirty="0">
+            <a:endParaRPr sz="1200" dirty="0">
               <a:solidFill>
-                <a:schemeClr val="accent6">
-                  <a:lumMod val="75000"/>
-                </a:schemeClr>
+                <a:srgbClr val="548235"/>
               </a:solidFill>
+              <a:latin typeface="Arial" panose="020B0604020202020204" pitchFamily="34" charset="0"/>
+              <a:cs typeface="Arial" panose="020B0604020202020204" pitchFamily="34" charset="0"/>
             </a:endParaRPr>
           </a:p>
           <a:p>
@@ -6136,22 +6920,67 @@
               </a:defRPr>
             </a:pPr>
             <a:r>
-              <a:rPr sz="1400" dirty="0"/>
+              <a:rPr sz="1200" dirty="0">
+                <a:solidFill>
+                  <a:srgbClr val="548235"/>
+                </a:solidFill>
+                <a:latin typeface="Arial" panose="020B0604020202020204" pitchFamily="34" charset="0"/>
+                <a:cs typeface="Arial" panose="020B0604020202020204" pitchFamily="34" charset="0"/>
+              </a:rPr>
               <a:t>20</a:t>
             </a:r>
             <a:r>
-              <a:rPr lang="en-US" sz="1400" dirty="0"/>
+              <a:rPr lang="en-US" sz="1200" dirty="0">
+                <a:solidFill>
+                  <a:srgbClr val="548235"/>
+                </a:solidFill>
+                <a:latin typeface="Arial" panose="020B0604020202020204" pitchFamily="34" charset="0"/>
+                <a:cs typeface="Arial" panose="020B0604020202020204" pitchFamily="34" charset="0"/>
+              </a:rPr>
               <a:t>,</a:t>
             </a:r>
             <a:r>
-              <a:rPr sz="1400" dirty="0"/>
+              <a:rPr sz="1200" dirty="0">
+                <a:solidFill>
+                  <a:srgbClr val="548235"/>
+                </a:solidFill>
+                <a:latin typeface="Arial" panose="020B0604020202020204" pitchFamily="34" charset="0"/>
+                <a:cs typeface="Arial" panose="020B0604020202020204" pitchFamily="34" charset="0"/>
+              </a:rPr>
               <a:t>4.8</a:t>
             </a:r>
             <a:r>
-              <a:rPr lang="en-US" sz="1400" dirty="0"/>
-              <a:t>, 1950-7-23</a:t>
-            </a:r>
-            <a:endParaRPr sz="1400" dirty="0"/>
+              <a:rPr lang="en-US" sz="1200" dirty="0">
+                <a:solidFill>
+                  <a:srgbClr val="548235"/>
+                </a:solidFill>
+                <a:latin typeface="Arial" panose="020B0604020202020204" pitchFamily="34" charset="0"/>
+                <a:cs typeface="Arial" panose="020B0604020202020204" pitchFamily="34" charset="0"/>
+              </a:rPr>
+              <a:t>, 1950-7-23,</a:t>
+            </a:r>
+            <a:r>
+              <a:rPr lang="zh-CN" altLang="en-US" sz="1200" b="0" i="0" dirty="0">
+                <a:solidFill>
+                  <a:srgbClr val="548235"/>
+                </a:solidFill>
+                <a:effectLst/>
+                <a:latin typeface="Arial" panose="020B0604020202020204" pitchFamily="34" charset="0"/>
+                <a:cs typeface="Arial" panose="020B0604020202020204" pitchFamily="34" charset="0"/>
+              </a:rPr>
+              <a:t> </a:t>
+            </a:r>
+            <a:r>
+              <a:rPr lang="en-US" altLang="zh-CN" sz="1200" b="0" i="0" dirty="0">
+                <a:solidFill>
+                  <a:srgbClr val="548235"/>
+                </a:solidFill>
+                <a:effectLst/>
+                <a:latin typeface="Arial" panose="020B0604020202020204" pitchFamily="34" charset="0"/>
+                <a:cs typeface="Arial" panose="020B0604020202020204" pitchFamily="34" charset="0"/>
+              </a:rPr>
+              <a:t>2031-11-30 12:25:30</a:t>
+            </a:r>
           </a:p>
         </p:txBody>
       </p:sp>
@@ -6163,8 +6992,8 @@
         </p:nvSpPr>
         <p:spPr>
           <a:xfrm>
-            <a:off x="3466318" y="4898431"/>
-            <a:ext cx="2108877" cy="1015659"/>
+            <a:off x="3601057" y="5103678"/>
+            <a:ext cx="2186944" cy="1754322"/>
           </a:xfrm>
           <a:prstGeom prst="rect">
             <a:avLst/>
@@ -6174,7 +7003,7 @@
           </a:ln>
           <a:extLst>
             <a:ext uri="{C572A759-6A51-4108-AA02-DFA0A04FC94B}">
-              <ma14:wrappingTextBoxFlag xmlns="" xmlns:m="http://schemas.openxmlformats.org/officeDocument/2006/math" xmlns:a14="http://schemas.microsoft.com/office/drawing/2010/main" xmlns:ma14="http://schemas.microsoft.com/office/mac/drawingml/2011/main" val="1"/>
+              <ma14:wrappingTextBoxFlag xmlns:ma14="http://schemas.microsoft.com/office/mac/drawingml/2011/main" xmlns:a14="http://schemas.microsoft.com/office/drawing/2010/main" xmlns:m="http://schemas.openxmlformats.org/officeDocument/2006/math" xmlns="" val="1"/>
             </a:ext>
           </a:extLst>
         </p:spPr>
@@ -6185,20 +7014,110 @@
           <a:lstStyle/>
           <a:p>
             <a:r>
-              <a:rPr sz="1200" dirty="0"/>
+              <a:rPr lang="en-US" altLang="zh-CN" sz="1200" dirty="0">
+                <a:solidFill>
+                  <a:srgbClr val="338DCD"/>
+                </a:solidFill>
+                <a:latin typeface="Arial" panose="020B0604020202020204" pitchFamily="34" charset="0"/>
+                <a:cs typeface="Arial" panose="020B0604020202020204" pitchFamily="34" charset="0"/>
+              </a:rPr>
+              <a:t>unstrNumericProp:Double:68</a:t>
+            </a:r>
+          </a:p>
+          <a:p>
+            <a:r>
+              <a:rPr lang="en-US" altLang="zh-CN" sz="1200" b="0" i="0" dirty="0">
+                <a:solidFill>
+                  <a:srgbClr val="338DCD"/>
+                </a:solidFill>
+                <a:effectLst/>
+                <a:latin typeface="Arial" panose="020B0604020202020204" pitchFamily="34" charset="0"/>
+                <a:cs typeface="Arial" panose="020B0604020202020204" pitchFamily="34" charset="0"/>
+              </a:rPr>
+              <a:t>unstrTimestampProp1:TIMESTAMP:1946-08-25 19:07:22</a:t>
+            </a:r>
+          </a:p>
+          <a:p>
+            <a:r>
+              <a:rPr lang="en-US" altLang="zh-CN" sz="1200" b="0" i="0" dirty="0">
+                <a:solidFill>
+                  <a:srgbClr val="338DCD"/>
+                </a:solidFill>
+                <a:effectLst/>
+                <a:latin typeface="Arial" panose="020B0604020202020204" pitchFamily="34" charset="0"/>
+                <a:cs typeface="Arial" panose="020B0604020202020204" pitchFamily="34" charset="0"/>
+              </a:rPr>
+              <a:t>unstrTimestampProp2:TIMESTAMP:2008-11-03 13:25:30.000526</a:t>
+            </a:r>
+            <a:endParaRPr lang="en-US" sz="1200" dirty="0">
+              <a:solidFill>
+                <a:srgbClr val="338DCD"/>
+              </a:solidFill>
+              <a:latin typeface="Arial" panose="020B0604020202020204" pitchFamily="34" charset="0"/>
+              <a:cs typeface="Arial" panose="020B0604020202020204" pitchFamily="34" charset="0"/>
+            </a:endParaRPr>
+          </a:p>
+          <a:p>
+            <a:r>
+              <a:rPr sz="1200" dirty="0">
+                <a:solidFill>
+                  <a:srgbClr val="548235"/>
+                </a:solidFill>
+                <a:latin typeface="Arial" panose="020B0604020202020204" pitchFamily="34" charset="0"/>
+                <a:cs typeface="Arial" panose="020B0604020202020204" pitchFamily="34" charset="0"/>
+              </a:rPr>
               <a:t>Eliz.</a:t>
             </a:r>
             <a:r>
-              <a:rPr lang="en-US" sz="1200" dirty="0"/>
-              <a:t>, 1,</a:t>
-            </a:r>
-          </a:p>
-          <a:p>
-            <a:r>
-              <a:rPr lang="en-US" sz="1200" dirty="0"/>
-              <a:t>False, True,</a:t>
-            </a:r>
-            <a:endParaRPr sz="1200" dirty="0"/>
+              <a:rPr lang="en-US" sz="1200" dirty="0">
+                <a:solidFill>
+                  <a:srgbClr val="548235"/>
+                </a:solidFill>
+                <a:latin typeface="Arial" panose="020B0604020202020204" pitchFamily="34" charset="0"/>
+                <a:cs typeface="Arial" panose="020B0604020202020204" pitchFamily="34" charset="0"/>
+              </a:rPr>
+              <a:t>, 1, False, True, </a:t>
+            </a:r>
+            <a:r>
+              <a:rPr sz="1200" dirty="0">
+                <a:solidFill>
+                  <a:srgbClr val="548235"/>
+                </a:solidFill>
+                <a:latin typeface="Arial" panose="020B0604020202020204" pitchFamily="34" charset="0"/>
+                <a:cs typeface="Arial" panose="020B0604020202020204" pitchFamily="34" charset="0"/>
+              </a:rPr>
+              <a:t>20</a:t>
+            </a:r>
+            <a:r>
+              <a:rPr lang="en-US" sz="1200" dirty="0">
+                <a:solidFill>
+                  <a:srgbClr val="548235"/>
+                </a:solidFill>
+                <a:latin typeface="Arial" panose="020B0604020202020204" pitchFamily="34" charset="0"/>
+                <a:cs typeface="Arial" panose="020B0604020202020204" pitchFamily="34" charset="0"/>
+              </a:rPr>
+              <a:t>, </a:t>
+            </a:r>
+            <a:r>
+              <a:rPr sz="1200" dirty="0">
+                <a:solidFill>
+                  <a:srgbClr val="548235"/>
+                </a:solidFill>
+                <a:latin typeface="Arial" panose="020B0604020202020204" pitchFamily="34" charset="0"/>
+                <a:cs typeface="Arial" panose="020B0604020202020204" pitchFamily="34" charset="0"/>
+              </a:rPr>
+              <a:t>4.7</a:t>
+            </a:r>
+            <a:r>
+              <a:rPr lang="en-US" sz="1200" dirty="0">
+                <a:solidFill>
+                  <a:srgbClr val="548235"/>
+                </a:solidFill>
+                <a:latin typeface="Arial" panose="020B0604020202020204" pitchFamily="34" charset="0"/>
+                <a:cs typeface="Arial" panose="020B0604020202020204" pitchFamily="34" charset="0"/>
+              </a:rPr>
+              <a:t>,</a:t>
+            </a:r>
           </a:p>
           <a:p>
             <a:pPr>
@@ -6211,52 +7130,33 @@
               </a:defRPr>
             </a:pPr>
             <a:r>
-              <a:rPr sz="1200" dirty="0"/>
-              <a:t>20</a:t>
-            </a:r>
-            <a:r>
-              <a:rPr lang="en-US" sz="1200" dirty="0"/>
-              <a:t>, </a:t>
-            </a:r>
-            <a:r>
-              <a:rPr sz="1200" dirty="0"/>
-              <a:t>4.7</a:t>
-            </a:r>
-            <a:r>
-              <a:rPr lang="en-US" sz="1200" dirty="0"/>
-              <a:t>,</a:t>
-            </a:r>
-          </a:p>
-          <a:p>
-            <a:pPr>
-              <a:defRPr>
-                <a:solidFill>
-                  <a:schemeClr val="accent6">
-                    <a:lumOff val="-9568"/>
-                  </a:schemeClr>
-                </a:solidFill>
-              </a:defRPr>
-            </a:pPr>
-            <a:r>
-              <a:rPr lang="en-US" sz="1200" dirty="0"/>
-              <a:t>1980-10-26,</a:t>
-            </a:r>
-          </a:p>
-          <a:p>
-            <a:pPr>
-              <a:defRPr>
-                <a:solidFill>
-                  <a:schemeClr val="accent6">
-                    <a:lumOff val="-9568"/>
-                  </a:schemeClr>
-                </a:solidFill>
-              </a:defRPr>
-            </a:pPr>
-            <a:r>
-              <a:rPr lang="en-US" sz="1200" dirty="0"/>
-              <a:t>unstrNumericProp:Double:68</a:t>
-            </a:r>
-            <a:endParaRPr sz="1200" dirty="0"/>
+              <a:rPr lang="en-US" sz="1200" dirty="0">
+                <a:solidFill>
+                  <a:srgbClr val="548235"/>
+                </a:solidFill>
+                <a:latin typeface="Arial" panose="020B0604020202020204" pitchFamily="34" charset="0"/>
+                <a:cs typeface="Arial" panose="020B0604020202020204" pitchFamily="34" charset="0"/>
+              </a:rPr>
+              <a:t>1980-10-26, </a:t>
+            </a:r>
+            <a:r>
+              <a:rPr lang="en-US" altLang="zh-CN" sz="1200" b="0" i="0" dirty="0">
+                <a:solidFill>
+                  <a:srgbClr val="548235"/>
+                </a:solidFill>
+                <a:effectLst/>
+                <a:latin typeface="Arial" panose="020B0604020202020204" pitchFamily="34" charset="0"/>
+                <a:cs typeface="Arial" panose="020B0604020202020204" pitchFamily="34" charset="0"/>
+              </a:rPr>
+              <a:t>1976-12-23 11:21:42</a:t>
+            </a:r>
+            <a:endParaRPr lang="en-US" sz="1200" dirty="0">
+              <a:solidFill>
+                <a:srgbClr val="548235"/>
+              </a:solidFill>
+              <a:latin typeface="Arial" panose="020B0604020202020204" pitchFamily="34" charset="0"/>
+              <a:cs typeface="Arial" panose="020B0604020202020204" pitchFamily="34" charset="0"/>
+            </a:endParaRPr>
           </a:p>
         </p:txBody>
       </p:sp>
@@ -6268,8 +7168,8 @@
         </p:nvSpPr>
         <p:spPr>
           <a:xfrm>
-            <a:off x="1777890" y="6046599"/>
-            <a:ext cx="1941630" cy="523216"/>
+            <a:off x="511179" y="5546169"/>
+            <a:ext cx="1941630" cy="646327"/>
           </a:xfrm>
           <a:prstGeom prst="rect">
             <a:avLst/>
@@ -6279,7 +7179,7 @@
           </a:ln>
           <a:extLst>
             <a:ext uri="{C572A759-6A51-4108-AA02-DFA0A04FC94B}">
-              <ma14:wrappingTextBoxFlag xmlns="" xmlns:m="http://schemas.openxmlformats.org/officeDocument/2006/math" xmlns:a14="http://schemas.microsoft.com/office/drawing/2010/main" xmlns:ma14="http://schemas.microsoft.com/office/mac/drawingml/2011/main" val="1"/>
+              <ma14:wrappingTextBoxFlag xmlns:ma14="http://schemas.microsoft.com/office/mac/drawingml/2011/main" xmlns:a14="http://schemas.microsoft.com/office/drawing/2010/main" xmlns:m="http://schemas.openxmlformats.org/officeDocument/2006/math" xmlns="" val="1"/>
             </a:ext>
           </a:extLst>
         </p:spPr>
@@ -6290,31 +7190,31 @@
           <a:lstStyle/>
           <a:p>
             <a:r>
-              <a:rPr sz="1400" dirty="0">
-                <a:solidFill>
-                  <a:schemeClr val="accent6">
-                    <a:lumMod val="75000"/>
-                  </a:schemeClr>
-                </a:solidFill>
+              <a:rPr sz="1200" dirty="0">
+                <a:solidFill>
+                  <a:srgbClr val="338DCD"/>
+                </a:solidFill>
+                <a:latin typeface="Arial" panose="020B0604020202020204" pitchFamily="34" charset="0"/>
+                <a:cs typeface="Arial" panose="020B0604020202020204" pitchFamily="34" charset="0"/>
               </a:rPr>
               <a:t>Farooq</a:t>
             </a:r>
             <a:r>
-              <a:rPr lang="en-US" sz="1400" dirty="0">
-                <a:solidFill>
-                  <a:schemeClr val="accent6">
-                    <a:lumMod val="75000"/>
-                  </a:schemeClr>
-                </a:solidFill>
+              <a:rPr lang="en-US" sz="1200" dirty="0">
+                <a:solidFill>
+                  <a:srgbClr val="338DCD"/>
+                </a:solidFill>
+                <a:latin typeface="Arial" panose="020B0604020202020204" pitchFamily="34" charset="0"/>
+                <a:cs typeface="Arial" panose="020B0604020202020204" pitchFamily="34" charset="0"/>
               </a:rPr>
               <a:t>, 2, true, false</a:t>
             </a:r>
-            <a:endParaRPr sz="1400" dirty="0">
+            <a:endParaRPr sz="1200" dirty="0">
               <a:solidFill>
-                <a:schemeClr val="accent6">
-                  <a:lumMod val="75000"/>
-                </a:schemeClr>
+                <a:srgbClr val="338DCD"/>
               </a:solidFill>
+              <a:latin typeface="Arial" panose="020B0604020202020204" pitchFamily="34" charset="0"/>
+              <a:cs typeface="Arial" panose="020B0604020202020204" pitchFamily="34" charset="0"/>
             </a:endParaRPr>
           </a:p>
           <a:p>
@@ -6328,22 +7228,73 @@
               </a:defRPr>
             </a:pPr>
             <a:r>
-              <a:rPr sz="1400" dirty="0"/>
+              <a:rPr sz="1200" dirty="0">
+                <a:solidFill>
+                  <a:srgbClr val="338DCD"/>
+                </a:solidFill>
+                <a:latin typeface="Arial" panose="020B0604020202020204" pitchFamily="34" charset="0"/>
+                <a:cs typeface="Arial" panose="020B0604020202020204" pitchFamily="34" charset="0"/>
+              </a:rPr>
               <a:t>25</a:t>
             </a:r>
             <a:r>
-              <a:rPr lang="en-US" sz="1400" dirty="0"/>
+              <a:rPr lang="en-US" sz="1200" dirty="0">
+                <a:solidFill>
+                  <a:srgbClr val="338DCD"/>
+                </a:solidFill>
+                <a:latin typeface="Arial" panose="020B0604020202020204" pitchFamily="34" charset="0"/>
+                <a:cs typeface="Arial" panose="020B0604020202020204" pitchFamily="34" charset="0"/>
+              </a:rPr>
               <a:t>, </a:t>
             </a:r>
             <a:r>
-              <a:rPr sz="1400" dirty="0"/>
+              <a:rPr sz="1200" dirty="0">
+                <a:solidFill>
+                  <a:srgbClr val="338DCD"/>
+                </a:solidFill>
+                <a:latin typeface="Arial" panose="020B0604020202020204" pitchFamily="34" charset="0"/>
+                <a:cs typeface="Arial" panose="020B0604020202020204" pitchFamily="34" charset="0"/>
+              </a:rPr>
               <a:t>4.5</a:t>
             </a:r>
             <a:r>
-              <a:rPr lang="en-US" sz="1400" dirty="0"/>
-              <a:t>, 1980-10-26</a:t>
-            </a:r>
-            <a:endParaRPr sz="1400" dirty="0"/>
+              <a:rPr lang="en-US" sz="1200" dirty="0">
+                <a:solidFill>
+                  <a:srgbClr val="338DCD"/>
+                </a:solidFill>
+                <a:latin typeface="Arial" panose="020B0604020202020204" pitchFamily="34" charset="0"/>
+                <a:cs typeface="Arial" panose="020B0604020202020204" pitchFamily="34" charset="0"/>
+              </a:rPr>
+              <a:t>, 1980-10-26,</a:t>
+            </a:r>
+            <a:r>
+              <a:rPr lang="zh-CN" altLang="en-US" sz="1200" dirty="0">
+                <a:solidFill>
+                  <a:srgbClr val="338DCD"/>
+                </a:solidFill>
+                <a:latin typeface="Arial" panose="020B0604020202020204" pitchFamily="34" charset="0"/>
+                <a:cs typeface="Arial" panose="020B0604020202020204" pitchFamily="34" charset="0"/>
+              </a:rPr>
+              <a:t> </a:t>
+            </a:r>
+            <a:r>
+              <a:rPr lang="en-US" altLang="zh-CN" sz="1200" b="0" i="0" dirty="0">
+                <a:solidFill>
+                  <a:srgbClr val="338DCD"/>
+                </a:solidFill>
+                <a:effectLst/>
+                <a:latin typeface="Arial" panose="020B0604020202020204" pitchFamily="34" charset="0"/>
+                <a:cs typeface="Arial" panose="020B0604020202020204" pitchFamily="34" charset="0"/>
+              </a:rPr>
+              <a:t>1972-07-31 13:22:30.678559</a:t>
+            </a:r>
+            <a:endParaRPr sz="1200" dirty="0">
+              <a:solidFill>
+                <a:srgbClr val="338DCD"/>
+              </a:solidFill>
+              <a:latin typeface="Arial" panose="020B0604020202020204" pitchFamily="34" charset="0"/>
+              <a:cs typeface="Arial" panose="020B0604020202020204" pitchFamily="34" charset="0"/>
+            </a:endParaRPr>
           </a:p>
         </p:txBody>
       </p:sp>
@@ -6355,8 +7306,8 @@
         </p:nvSpPr>
         <p:spPr>
           <a:xfrm>
-            <a:off x="4632396" y="5990323"/>
-            <a:ext cx="1720461" cy="523216"/>
+            <a:off x="6177571" y="5726659"/>
+            <a:ext cx="3119967" cy="1200325"/>
           </a:xfrm>
           <a:prstGeom prst="rect">
             <a:avLst/>
@@ -6366,7 +7317,7 @@
           </a:ln>
           <a:extLst>
             <a:ext uri="{C572A759-6A51-4108-AA02-DFA0A04FC94B}">
-              <ma14:wrappingTextBoxFlag xmlns="" xmlns:m="http://schemas.openxmlformats.org/officeDocument/2006/math" xmlns:a14="http://schemas.microsoft.com/office/drawing/2010/main" xmlns:ma14="http://schemas.microsoft.com/office/mac/drawingml/2011/main" val="1"/>
+              <ma14:wrappingTextBoxFlag xmlns:ma14="http://schemas.microsoft.com/office/mac/drawingml/2011/main" xmlns:a14="http://schemas.microsoft.com/office/drawing/2010/main" xmlns:m="http://schemas.openxmlformats.org/officeDocument/2006/math" xmlns="" val="1"/>
             </a:ext>
           </a:extLst>
         </p:spPr>
@@ -6377,31 +7328,64 @@
           <a:lstStyle/>
           <a:p>
             <a:r>
-              <a:rPr sz="1400" dirty="0">
-                <a:solidFill>
-                  <a:schemeClr val="accent6">
-                    <a:lumMod val="75000"/>
-                  </a:schemeClr>
-                </a:solidFill>
+              <a:rPr lang="en-US" altLang="zh-CN" sz="1200" b="0" i="0" dirty="0">
+                <a:solidFill>
+                  <a:srgbClr val="338DCD"/>
+                </a:solidFill>
+                <a:effectLst/>
+                <a:latin typeface="Arial" panose="020B0604020202020204" pitchFamily="34" charset="0"/>
+                <a:cs typeface="Arial" panose="020B0604020202020204" pitchFamily="34" charset="0"/>
+              </a:rPr>
+              <a:t>unstrTimestampProp1:TIMESTAMP:1962-05-22 13:11:22.562</a:t>
+            </a:r>
+          </a:p>
+          <a:p>
+            <a:r>
+              <a:rPr lang="en-US" altLang="zh-CN" sz="1200" b="0" i="0" dirty="0">
+                <a:solidFill>
+                  <a:srgbClr val="338DCD"/>
+                </a:solidFill>
+                <a:effectLst/>
+                <a:latin typeface="Arial" panose="020B0604020202020204" pitchFamily="34" charset="0"/>
+                <a:cs typeface="Arial" panose="020B0604020202020204" pitchFamily="34" charset="0"/>
+              </a:rPr>
+              <a:t>unstrTimestampProp2:TIMESTAMP:1976-12-23 11:21:42</a:t>
+            </a:r>
+            <a:endParaRPr lang="en-US" sz="1200" dirty="0">
+              <a:solidFill>
+                <a:srgbClr val="338DCD"/>
+              </a:solidFill>
+              <a:latin typeface="Arial" panose="020B0604020202020204" pitchFamily="34" charset="0"/>
+              <a:cs typeface="Arial" panose="020B0604020202020204" pitchFamily="34" charset="0"/>
+            </a:endParaRPr>
+          </a:p>
+          <a:p>
+            <a:r>
+              <a:rPr sz="1200" dirty="0">
+                <a:solidFill>
+                  <a:srgbClr val="548235"/>
+                </a:solidFill>
+                <a:latin typeface="Arial" panose="020B0604020202020204" pitchFamily="34" charset="0"/>
+                <a:cs typeface="Arial" panose="020B0604020202020204" pitchFamily="34" charset="0"/>
               </a:rPr>
               <a:t>Greg</a:t>
             </a:r>
             <a:r>
-              <a:rPr lang="en-US" sz="1400" dirty="0">
-                <a:solidFill>
-                  <a:schemeClr val="accent6">
-                    <a:lumMod val="75000"/>
-                  </a:schemeClr>
-                </a:solidFill>
+              <a:rPr lang="en-US" sz="1200" dirty="0">
+                <a:solidFill>
+                  <a:srgbClr val="548235"/>
+                </a:solidFill>
+                <a:latin typeface="Arial" panose="020B0604020202020204" pitchFamily="34" charset="0"/>
+                <a:cs typeface="Arial" panose="020B0604020202020204" pitchFamily="34" charset="0"/>
               </a:rPr>
               <a:t>, 2, false, false</a:t>
             </a:r>
-            <a:endParaRPr sz="1400" dirty="0">
+            <a:endParaRPr sz="1200" dirty="0">
               <a:solidFill>
-                <a:schemeClr val="accent6">
-                  <a:lumMod val="75000"/>
-                </a:schemeClr>
+                <a:srgbClr val="548235"/>
               </a:solidFill>
+              <a:latin typeface="Arial" panose="020B0604020202020204" pitchFamily="34" charset="0"/>
+              <a:cs typeface="Arial" panose="020B0604020202020204" pitchFamily="34" charset="0"/>
             </a:endParaRPr>
           </a:p>
           <a:p>
@@ -6415,22 +7399,56 @@
               </a:defRPr>
             </a:pPr>
             <a:r>
-              <a:rPr sz="1400" dirty="0"/>
+              <a:rPr sz="1200" dirty="0">
+                <a:solidFill>
+                  <a:srgbClr val="548235"/>
+                </a:solidFill>
+                <a:latin typeface="Arial" panose="020B0604020202020204" pitchFamily="34" charset="0"/>
+                <a:cs typeface="Arial" panose="020B0604020202020204" pitchFamily="34" charset="0"/>
+              </a:rPr>
               <a:t>40</a:t>
             </a:r>
             <a:r>
-              <a:rPr lang="en-US" sz="1400" dirty="0"/>
+              <a:rPr lang="en-US" sz="1200" dirty="0">
+                <a:solidFill>
+                  <a:srgbClr val="548235"/>
+                </a:solidFill>
+                <a:latin typeface="Arial" panose="020B0604020202020204" pitchFamily="34" charset="0"/>
+                <a:cs typeface="Arial" panose="020B0604020202020204" pitchFamily="34" charset="0"/>
+              </a:rPr>
               <a:t>, </a:t>
             </a:r>
             <a:r>
-              <a:rPr sz="1400" dirty="0"/>
+              <a:rPr sz="1200" dirty="0">
+                <a:solidFill>
+                  <a:srgbClr val="548235"/>
+                </a:solidFill>
+                <a:latin typeface="Arial" panose="020B0604020202020204" pitchFamily="34" charset="0"/>
+                <a:cs typeface="Arial" panose="020B0604020202020204" pitchFamily="34" charset="0"/>
+              </a:rPr>
               <a:t>4.9</a:t>
             </a:r>
             <a:r>
-              <a:rPr lang="en-US" sz="1400" dirty="0"/>
-              <a:t>, 1980-10-26</a:t>
-            </a:r>
-            <a:endParaRPr sz="1400" dirty="0"/>
+              <a:rPr lang="en-US" sz="1200" dirty="0">
+                <a:solidFill>
+                  <a:srgbClr val="548235"/>
+                </a:solidFill>
+                <a:latin typeface="Arial" panose="020B0604020202020204" pitchFamily="34" charset="0"/>
+                <a:cs typeface="Arial" panose="020B0604020202020204" pitchFamily="34" charset="0"/>
+              </a:rPr>
+              <a:t>, 1980-10-26, </a:t>
+            </a:r>
+            <a:r>
+              <a:rPr lang="en-US" altLang="zh-CN" sz="1200" b="0" i="0" dirty="0">
+                <a:solidFill>
+                  <a:srgbClr val="548235"/>
+                </a:solidFill>
+                <a:effectLst/>
+                <a:latin typeface="Arial" panose="020B0604020202020204" pitchFamily="34" charset="0"/>
+                <a:cs typeface="Arial" panose="020B0604020202020204" pitchFamily="34" charset="0"/>
+              </a:rPr>
+              <a:t>1976-12-23 11:21:42</a:t>
+            </a:r>
           </a:p>
         </p:txBody>
       </p:sp>
@@ -6442,8 +7460,8 @@
         </p:nvSpPr>
         <p:spPr>
           <a:xfrm>
-            <a:off x="9288919" y="55782"/>
-            <a:ext cx="2414556" cy="1600434"/>
+            <a:off x="9972705" y="85505"/>
+            <a:ext cx="2234297" cy="1692767"/>
           </a:xfrm>
           <a:prstGeom prst="rect">
             <a:avLst/>
@@ -6453,86 +7471,86 @@
           </a:ln>
           <a:extLst>
             <a:ext uri="{C572A759-6A51-4108-AA02-DFA0A04FC94B}">
-              <ma14:wrappingTextBoxFlag xmlns="" xmlns:m="http://schemas.openxmlformats.org/officeDocument/2006/math" xmlns:a14="http://schemas.microsoft.com/office/drawing/2010/main" xmlns:ma14="http://schemas.microsoft.com/office/mac/drawingml/2011/main" val="1"/>
+              <ma14:wrappingTextBoxFlag xmlns:ma14="http://schemas.microsoft.com/office/mac/drawingml/2011/main" xmlns:a14="http://schemas.microsoft.com/office/drawing/2010/main" xmlns:m="http://schemas.openxmlformats.org/officeDocument/2006/math" xmlns="" val="1"/>
             </a:ext>
           </a:extLst>
         </p:spPr>
         <p:txBody>
-          <a:bodyPr lIns="45718" tIns="45718" rIns="45718" bIns="45718">
+          <a:bodyPr wrap="square" lIns="45718" tIns="45718" rIns="45718" bIns="45718">
             <a:spAutoFit/>
           </a:bodyPr>
           <a:lstStyle/>
           <a:p>
             <a:r>
-              <a:rPr sz="1400" dirty="0" err="1">
-                <a:solidFill>
-                  <a:schemeClr val="accent6">
-                    <a:lumMod val="75000"/>
-                  </a:schemeClr>
-                </a:solidFill>
+              <a:rPr sz="1300" dirty="0" err="1">
+                <a:solidFill>
+                  <a:srgbClr val="548235"/>
+                </a:solidFill>
+                <a:latin typeface="Arial" panose="020B0604020202020204" pitchFamily="34" charset="0"/>
+                <a:cs typeface="Arial" panose="020B0604020202020204" pitchFamily="34" charset="0"/>
               </a:rPr>
               <a:t>fName:String</a:t>
             </a:r>
-            <a:endParaRPr sz="1400" dirty="0">
+            <a:endParaRPr sz="1300" dirty="0">
               <a:solidFill>
-                <a:schemeClr val="accent6">
-                  <a:lumMod val="75000"/>
-                </a:schemeClr>
+                <a:srgbClr val="548235"/>
               </a:solidFill>
+              <a:latin typeface="Arial" panose="020B0604020202020204" pitchFamily="34" charset="0"/>
+              <a:cs typeface="Arial" panose="020B0604020202020204" pitchFamily="34" charset="0"/>
             </a:endParaRPr>
           </a:p>
           <a:p>
             <a:r>
-              <a:rPr sz="1400" dirty="0">
-                <a:solidFill>
-                  <a:schemeClr val="accent6">
-                    <a:lumMod val="75000"/>
-                  </a:schemeClr>
-                </a:solidFill>
+              <a:rPr sz="1300" dirty="0">
+                <a:solidFill>
+                  <a:srgbClr val="548235"/>
+                </a:solidFill>
+                <a:latin typeface="Arial" panose="020B0604020202020204" pitchFamily="34" charset="0"/>
+                <a:cs typeface="Arial" panose="020B0604020202020204" pitchFamily="34" charset="0"/>
               </a:rPr>
               <a:t>gender: Int (1=F, 2=M)</a:t>
             </a:r>
           </a:p>
           <a:p>
             <a:r>
-              <a:rPr sz="1400" dirty="0" err="1">
-                <a:solidFill>
-                  <a:schemeClr val="accent6">
-                    <a:lumMod val="75000"/>
-                  </a:schemeClr>
-                </a:solidFill>
+              <a:rPr sz="1300" dirty="0" err="1">
+                <a:solidFill>
+                  <a:srgbClr val="548235"/>
+                </a:solidFill>
+                <a:latin typeface="Arial" panose="020B0604020202020204" pitchFamily="34" charset="0"/>
+                <a:cs typeface="Arial" panose="020B0604020202020204" pitchFamily="34" charset="0"/>
               </a:rPr>
               <a:t>isWorker</a:t>
             </a:r>
             <a:r>
-              <a:rPr sz="1400" dirty="0">
-                <a:solidFill>
-                  <a:schemeClr val="accent6">
-                    <a:lumMod val="75000"/>
-                  </a:schemeClr>
-                </a:solidFill>
+              <a:rPr sz="1300" dirty="0">
+                <a:solidFill>
+                  <a:srgbClr val="548235"/>
+                </a:solidFill>
+                <a:latin typeface="Arial" panose="020B0604020202020204" pitchFamily="34" charset="0"/>
+                <a:cs typeface="Arial" panose="020B0604020202020204" pitchFamily="34" charset="0"/>
               </a:rPr>
               <a:t>: Boolean</a:t>
             </a:r>
           </a:p>
           <a:p>
             <a:r>
-              <a:rPr sz="1400" dirty="0" err="1">
-                <a:solidFill>
-                  <a:schemeClr val="accent6">
-                    <a:lumMod val="75000"/>
-                  </a:schemeClr>
-                </a:solidFill>
+              <a:rPr sz="1300" dirty="0" err="1">
+                <a:solidFill>
+                  <a:srgbClr val="548235"/>
+                </a:solidFill>
+                <a:latin typeface="Arial" panose="020B0604020202020204" pitchFamily="34" charset="0"/>
+                <a:cs typeface="Arial" panose="020B0604020202020204" pitchFamily="34" charset="0"/>
               </a:rPr>
               <a:t>isStudent</a:t>
             </a:r>
             <a:r>
-              <a:rPr sz="1400" dirty="0">
-                <a:solidFill>
-                  <a:schemeClr val="accent6">
-                    <a:lumMod val="75000"/>
-                  </a:schemeClr>
-                </a:solidFill>
+              <a:rPr sz="1300" dirty="0">
+                <a:solidFill>
+                  <a:srgbClr val="548235"/>
+                </a:solidFill>
+                <a:latin typeface="Arial" panose="020B0604020202020204" pitchFamily="34" charset="0"/>
+                <a:cs typeface="Arial" panose="020B0604020202020204" pitchFamily="34" charset="0"/>
               </a:rPr>
               <a:t>: Boolean</a:t>
             </a:r>
@@ -6548,12 +7566,12 @@
               </a:defRPr>
             </a:pPr>
             <a:r>
-              <a:rPr sz="1400" dirty="0">
-                <a:solidFill>
-                  <a:schemeClr val="accent6">
-                    <a:lumMod val="75000"/>
-                  </a:schemeClr>
-                </a:solidFill>
+              <a:rPr sz="1300" dirty="0">
+                <a:solidFill>
+                  <a:srgbClr val="548235"/>
+                </a:solidFill>
+                <a:latin typeface="Arial" panose="020B0604020202020204" pitchFamily="34" charset="0"/>
+                <a:cs typeface="Arial" panose="020B0604020202020204" pitchFamily="34" charset="0"/>
               </a:rPr>
               <a:t>age: Int</a:t>
             </a:r>
@@ -6570,51 +7588,51 @@
               </a:defRPr>
             </a:pPr>
             <a:r>
-              <a:rPr sz="1400" dirty="0" err="1">
-                <a:solidFill>
-                  <a:schemeClr val="accent6">
-                    <a:lumMod val="75000"/>
-                  </a:schemeClr>
-                </a:solidFill>
+              <a:rPr sz="1300" dirty="0" err="1">
+                <a:solidFill>
+                  <a:srgbClr val="548235"/>
+                </a:solidFill>
+                <a:latin typeface="Arial" panose="020B0604020202020204" pitchFamily="34" charset="0"/>
+                <a:cs typeface="Arial" panose="020B0604020202020204" pitchFamily="34" charset="0"/>
               </a:rPr>
               <a:t>eyeSight</a:t>
             </a:r>
             <a:r>
-              <a:rPr sz="1400" dirty="0">
-                <a:solidFill>
-                  <a:schemeClr val="accent6">
-                    <a:lumMod val="75000"/>
-                  </a:schemeClr>
-                </a:solidFill>
+              <a:rPr sz="1300" dirty="0">
+                <a:solidFill>
+                  <a:srgbClr val="548235"/>
+                </a:solidFill>
+                <a:latin typeface="Arial" panose="020B0604020202020204" pitchFamily="34" charset="0"/>
+                <a:cs typeface="Arial" panose="020B0604020202020204" pitchFamily="34" charset="0"/>
               </a:rPr>
               <a:t>:</a:t>
             </a:r>
             <a:r>
-              <a:rPr lang="en-US" sz="1400" dirty="0">
-                <a:solidFill>
-                  <a:schemeClr val="accent6">
-                    <a:lumMod val="75000"/>
-                  </a:schemeClr>
-                </a:solidFill>
+              <a:rPr lang="en-US" sz="1300" dirty="0">
+                <a:solidFill>
+                  <a:srgbClr val="548235"/>
+                </a:solidFill>
+                <a:latin typeface="Arial" panose="020B0604020202020204" pitchFamily="34" charset="0"/>
+                <a:cs typeface="Arial" panose="020B0604020202020204" pitchFamily="34" charset="0"/>
               </a:rPr>
               <a:t> </a:t>
             </a:r>
             <a:r>
-              <a:rPr sz="1400" dirty="0">
-                <a:solidFill>
-                  <a:schemeClr val="accent6">
-                    <a:lumMod val="75000"/>
-                  </a:schemeClr>
-                </a:solidFill>
+              <a:rPr sz="1300" dirty="0">
+                <a:solidFill>
+                  <a:srgbClr val="548235"/>
+                </a:solidFill>
+                <a:latin typeface="Arial" panose="020B0604020202020204" pitchFamily="34" charset="0"/>
+                <a:cs typeface="Arial" panose="020B0604020202020204" pitchFamily="34" charset="0"/>
               </a:rPr>
               <a:t>Double</a:t>
             </a:r>
-            <a:endParaRPr lang="en-US" sz="1400" dirty="0">
+            <a:endParaRPr lang="en-US" sz="1300" dirty="0">
               <a:solidFill>
-                <a:schemeClr val="accent6">
-                  <a:lumMod val="75000"/>
-                </a:schemeClr>
+                <a:srgbClr val="548235"/>
               </a:solidFill>
+              <a:latin typeface="Arial" panose="020B0604020202020204" pitchFamily="34" charset="0"/>
+              <a:cs typeface="Arial" panose="020B0604020202020204" pitchFamily="34" charset="0"/>
             </a:endParaRPr>
           </a:p>
           <a:p>
@@ -6629,21 +7647,44 @@
               </a:defRPr>
             </a:pPr>
             <a:r>
-              <a:rPr lang="en-US" sz="1400" dirty="0">
-                <a:solidFill>
-                  <a:schemeClr val="accent6">
-                    <a:lumMod val="75000"/>
+              <a:rPr lang="en-US" sz="1300" dirty="0">
+                <a:solidFill>
+                  <a:srgbClr val="548235"/>
+                </a:solidFill>
+                <a:latin typeface="Arial" panose="020B0604020202020204" pitchFamily="34" charset="0"/>
+                <a:cs typeface="Arial" panose="020B0604020202020204" pitchFamily="34" charset="0"/>
+              </a:rPr>
+              <a:t>Birthdate: Date</a:t>
+            </a:r>
+          </a:p>
+          <a:p>
+            <a:pPr>
+              <a:defRPr>
+                <a:solidFill>
+                  <a:schemeClr val="accent1">
+                    <a:satOff val="-3547"/>
+                    <a:lumOff val="-10352"/>
                   </a:schemeClr>
                 </a:solidFill>
-              </a:rPr>
-              <a:t>Birthdate: Date</a:t>
-            </a:r>
-            <a:endParaRPr sz="1400" dirty="0">
+              </a:defRPr>
+            </a:pPr>
+            <a:r>
+              <a:rPr lang="en-US" altLang="zh-CN" sz="1300" b="0" i="0" dirty="0" err="1">
+                <a:solidFill>
+                  <a:srgbClr val="548235"/>
+                </a:solidFill>
+                <a:effectLst/>
+                <a:latin typeface="Arial" panose="020B0604020202020204" pitchFamily="34" charset="0"/>
+                <a:cs typeface="Arial" panose="020B0604020202020204" pitchFamily="34" charset="0"/>
+              </a:rPr>
+              <a:t>registerTime:Timestamp</a:t>
+            </a:r>
+            <a:endParaRPr sz="1300" dirty="0">
               <a:solidFill>
-                <a:schemeClr val="accent6">
-                  <a:lumMod val="75000"/>
-                </a:schemeClr>
+                <a:srgbClr val="548235"/>
               </a:solidFill>
+              <a:latin typeface="Arial" panose="020B0604020202020204" pitchFamily="34" charset="0"/>
+              <a:cs typeface="Arial" panose="020B0604020202020204" pitchFamily="34" charset="0"/>
             </a:endParaRPr>
           </a:p>
         </p:txBody>
@@ -6656,8 +7697,8 @@
         </p:nvSpPr>
         <p:spPr>
           <a:xfrm>
-            <a:off x="9955427" y="1752043"/>
-            <a:ext cx="1310611" cy="923326"/>
+            <a:off x="9972705" y="1768686"/>
+            <a:ext cx="1039704" cy="892548"/>
           </a:xfrm>
           <a:prstGeom prst="rect">
             <a:avLst/>
@@ -6667,7 +7708,7 @@
           </a:ln>
           <a:extLst>
             <a:ext uri="{C572A759-6A51-4108-AA02-DFA0A04FC94B}">
-              <ma14:wrappingTextBoxFlag xmlns="" xmlns:m="http://schemas.openxmlformats.org/officeDocument/2006/math" xmlns:a14="http://schemas.microsoft.com/office/drawing/2010/main" xmlns:ma14="http://schemas.microsoft.com/office/mac/drawingml/2011/main" val="1"/>
+              <ma14:wrappingTextBoxFlag xmlns:ma14="http://schemas.microsoft.com/office/mac/drawingml/2011/main" xmlns:a14="http://schemas.microsoft.com/office/drawing/2010/main" xmlns:m="http://schemas.openxmlformats.org/officeDocument/2006/math" xmlns="" val="1"/>
             </a:ext>
           </a:extLst>
         </p:spPr>
@@ -6678,28 +7719,40 @@
           <a:lstStyle/>
           <a:p>
             <a:r>
-              <a:rPr dirty="0" err="1"/>
+              <a:rPr sz="1300" dirty="0" err="1">
+                <a:solidFill>
+                  <a:srgbClr val="548235"/>
+                </a:solidFill>
+                <a:latin typeface="Arial" panose="020B0604020202020204" pitchFamily="34" charset="0"/>
+                <a:cs typeface="Arial" panose="020B0604020202020204" pitchFamily="34" charset="0"/>
+              </a:rPr>
               <a:t>name:String</a:t>
             </a:r>
-            <a:endParaRPr dirty="0"/>
-          </a:p>
-          <a:p>
-            <a:r>
-              <a:rPr dirty="0" err="1">
-                <a:solidFill>
-                  <a:schemeClr val="accent2">
-                    <a:lumMod val="75000"/>
-                  </a:schemeClr>
-                </a:solidFill>
+            <a:endParaRPr sz="1300" dirty="0">
+              <a:solidFill>
+                <a:srgbClr val="548235"/>
+              </a:solidFill>
+              <a:latin typeface="Arial" panose="020B0604020202020204" pitchFamily="34" charset="0"/>
+              <a:cs typeface="Arial" panose="020B0604020202020204" pitchFamily="34" charset="0"/>
+            </a:endParaRPr>
+          </a:p>
+          <a:p>
+            <a:r>
+              <a:rPr sz="1300" dirty="0" err="1">
+                <a:solidFill>
+                  <a:srgbClr val="548235"/>
+                </a:solidFill>
+                <a:latin typeface="Arial" panose="020B0604020202020204" pitchFamily="34" charset="0"/>
+                <a:cs typeface="Arial" panose="020B0604020202020204" pitchFamily="34" charset="0"/>
               </a:rPr>
               <a:t>orgCode:Int</a:t>
             </a:r>
-            <a:endParaRPr dirty="0">
+            <a:endParaRPr sz="1300" dirty="0">
               <a:solidFill>
-                <a:schemeClr val="accent2">
-                  <a:lumMod val="75000"/>
-                </a:schemeClr>
+                <a:srgbClr val="548235"/>
               </a:solidFill>
+              <a:latin typeface="Arial" panose="020B0604020202020204" pitchFamily="34" charset="0"/>
+              <a:cs typeface="Arial" panose="020B0604020202020204" pitchFamily="34" charset="0"/>
             </a:endParaRPr>
           </a:p>
           <a:p>
@@ -6714,10 +7767,52 @@
               </a:defRPr>
             </a:pPr>
             <a:r>
-              <a:rPr dirty="0" err="1"/>
+              <a:rPr sz="1300" dirty="0" err="1">
+                <a:solidFill>
+                  <a:srgbClr val="548235"/>
+                </a:solidFill>
+                <a:latin typeface="Arial" panose="020B0604020202020204" pitchFamily="34" charset="0"/>
+                <a:cs typeface="Arial" panose="020B0604020202020204" pitchFamily="34" charset="0"/>
+              </a:rPr>
               <a:t>mark:Double</a:t>
             </a:r>
-            <a:endParaRPr dirty="0"/>
+            <a:endParaRPr lang="en-US" sz="1300" dirty="0">
+              <a:solidFill>
+                <a:srgbClr val="548235"/>
+              </a:solidFill>
+              <a:latin typeface="Arial" panose="020B0604020202020204" pitchFamily="34" charset="0"/>
+              <a:cs typeface="Arial" panose="020B0604020202020204" pitchFamily="34" charset="0"/>
+            </a:endParaRPr>
+          </a:p>
+          <a:p>
+            <a:pPr>
+              <a:defRPr>
+                <a:solidFill>
+                  <a:schemeClr val="accent2">
+                    <a:satOff val="-18194"/>
+                    <a:lumOff val="-11215"/>
+                  </a:schemeClr>
+                </a:solidFill>
+              </a:defRPr>
+            </a:pPr>
+            <a:r>
+              <a:rPr lang="en-US" altLang="zh-CN" sz="1300" b="0" i="0" dirty="0" err="1">
+                <a:solidFill>
+                  <a:srgbClr val="548235"/>
+                </a:solidFill>
+                <a:effectLst/>
+                <a:latin typeface="Arial" panose="020B0604020202020204" pitchFamily="34" charset="0"/>
+                <a:cs typeface="Arial" panose="020B0604020202020204" pitchFamily="34" charset="0"/>
+              </a:rPr>
+              <a:t>score:Int</a:t>
+            </a:r>
+            <a:endParaRPr sz="1300" dirty="0">
+              <a:solidFill>
+                <a:srgbClr val="548235"/>
+              </a:solidFill>
+              <a:latin typeface="Arial" panose="020B0604020202020204" pitchFamily="34" charset="0"/>
+              <a:cs typeface="Arial" panose="020B0604020202020204" pitchFamily="34" charset="0"/>
+            </a:endParaRPr>
           </a:p>
         </p:txBody>
       </p:sp>
@@ -6798,7 +7893,7 @@
           <a:effectLst/>
           <a:extLst>
             <a:ext uri="{C572A759-6A51-4108-AA02-DFA0A04FC94B}">
-              <ma14:wrappingTextBoxFlag xmlns="" xmlns:m="http://schemas.openxmlformats.org/officeDocument/2006/math" xmlns:a14="http://schemas.microsoft.com/office/drawing/2010/main" xmlns:ma14="http://schemas.microsoft.com/office/mac/drawingml/2011/main" val="1"/>
+              <ma14:wrappingTextBoxFlag xmlns:ma14="http://schemas.microsoft.com/office/mac/drawingml/2011/main" xmlns:a14="http://schemas.microsoft.com/office/drawing/2010/main" xmlns:m="http://schemas.openxmlformats.org/officeDocument/2006/math" xmlns="" val="1"/>
             </a:ext>
           </a:extLst>
         </p:spPr>
@@ -6838,8 +7933,8 @@
         </p:nvSpPr>
         <p:spPr>
           <a:xfrm>
-            <a:off x="6976204" y="5375601"/>
-            <a:ext cx="1720461" cy="523216"/>
+            <a:off x="8006006" y="4572284"/>
+            <a:ext cx="3062353" cy="830993"/>
           </a:xfrm>
           <a:prstGeom prst="rect">
             <a:avLst/>
@@ -6849,7 +7944,7 @@
           </a:ln>
           <a:extLst>
             <a:ext uri="{C572A759-6A51-4108-AA02-DFA0A04FC94B}">
-              <ma14:wrappingTextBoxFlag xmlns="" xmlns:m="http://schemas.openxmlformats.org/officeDocument/2006/math" xmlns:a14="http://schemas.microsoft.com/office/drawing/2010/main" xmlns:ma14="http://schemas.microsoft.com/office/mac/drawingml/2011/main" val="1"/>
+              <ma14:wrappingTextBoxFlag xmlns:ma14="http://schemas.microsoft.com/office/mac/drawingml/2011/main" xmlns:a14="http://schemas.microsoft.com/office/drawing/2010/main" xmlns:m="http://schemas.openxmlformats.org/officeDocument/2006/math" xmlns="" val="1"/>
             </a:ext>
           </a:extLst>
         </p:spPr>
@@ -6860,22 +7955,35 @@
           <a:lstStyle/>
           <a:p>
             <a:r>
-              <a:rPr lang="en-US" sz="1400" dirty="0">
-                <a:solidFill>
-                  <a:schemeClr val="accent6">
-                    <a:lumMod val="75000"/>
-                  </a:schemeClr>
-                </a:solidFill>
+              <a:rPr lang="en-US" altLang="zh-CN" sz="1200" b="0" i="0" dirty="0">
+                <a:solidFill>
+                  <a:srgbClr val="338DCD"/>
+                </a:solidFill>
+                <a:effectLst/>
+                <a:latin typeface="Arial" panose="020B0604020202020204" pitchFamily="34" charset="0"/>
+                <a:cs typeface="Arial" panose="020B0604020202020204" pitchFamily="34" charset="0"/>
+              </a:rPr>
+              <a:t>unstrTimestampProp1:TIMESTAMP:2023-02-21 13:25:30</a:t>
+            </a:r>
+            <a:endParaRPr lang="en-US" sz="1200" dirty="0">
+              <a:solidFill>
+                <a:srgbClr val="338DCD"/>
+              </a:solidFill>
+              <a:latin typeface="Arial" panose="020B0604020202020204" pitchFamily="34" charset="0"/>
+              <a:cs typeface="Arial" panose="020B0604020202020204" pitchFamily="34" charset="0"/>
+            </a:endParaRPr>
+          </a:p>
+          <a:p>
+            <a:r>
+              <a:rPr lang="en-US" sz="1200" dirty="0">
+                <a:solidFill>
+                  <a:srgbClr val="548235"/>
+                </a:solidFill>
+                <a:latin typeface="Arial" panose="020B0604020202020204" pitchFamily="34" charset="0"/>
+                <a:cs typeface="Arial" panose="020B0604020202020204" pitchFamily="34" charset="0"/>
               </a:rPr>
               <a:t>Hubert., 2, false, true</a:t>
             </a:r>
-            <a:endParaRPr sz="1400" dirty="0">
-              <a:solidFill>
-                <a:schemeClr val="accent6">
-                  <a:lumMod val="75000"/>
-                </a:schemeClr>
-              </a:solidFill>
-            </a:endParaRPr>
           </a:p>
           <a:p>
             <a:pPr>
@@ -6888,18 +7996,33 @@
               </a:defRPr>
             </a:pPr>
             <a:r>
-              <a:rPr lang="en-US" sz="1400" dirty="0"/>
-              <a:t>83, </a:t>
-            </a:r>
-            <a:r>
-              <a:rPr sz="1400" dirty="0"/>
-              <a:t>4.9</a:t>
-            </a:r>
-            <a:r>
-              <a:rPr lang="en-US" sz="1400" dirty="0"/>
-              <a:t>, 1990-11-27</a:t>
-            </a:r>
-            <a:endParaRPr sz="1400" dirty="0"/>
+              <a:rPr lang="en-US" sz="1200" dirty="0">
+                <a:solidFill>
+                  <a:srgbClr val="548235"/>
+                </a:solidFill>
+                <a:latin typeface="Arial" panose="020B0604020202020204" pitchFamily="34" charset="0"/>
+                <a:cs typeface="Arial" panose="020B0604020202020204" pitchFamily="34" charset="0"/>
+              </a:rPr>
+              <a:t>83, 4.9, 1990-11-27, </a:t>
+            </a:r>
+            <a:r>
+              <a:rPr lang="en-US" altLang="zh-CN" sz="1200" b="0" i="0" dirty="0">
+                <a:solidFill>
+                  <a:srgbClr val="548235"/>
+                </a:solidFill>
+                <a:effectLst/>
+                <a:latin typeface="Arial" panose="020B0604020202020204" pitchFamily="34" charset="0"/>
+                <a:cs typeface="Arial" panose="020B0604020202020204" pitchFamily="34" charset="0"/>
+              </a:rPr>
+              <a:t>2023-02-21 13:25:30</a:t>
+            </a:r>
+            <a:endParaRPr lang="en-US" sz="1200" dirty="0">
+              <a:solidFill>
+                <a:srgbClr val="548235"/>
+              </a:solidFill>
+              <a:latin typeface="Arial" panose="020B0604020202020204" pitchFamily="34" charset="0"/>
+              <a:cs typeface="Arial" panose="020B0604020202020204" pitchFamily="34" charset="0"/>
+            </a:endParaRPr>
           </a:p>
         </p:txBody>
       </p:sp>

</xml_diff>